<commit_message>
Added new version of the workshop.
</commit_message>
<xml_diff>
--- a/slides/end-to-end-ml-sm.pptx
+++ b/slides/end-to-end-ml-sm.pptx
@@ -365,7 +365,7 @@
           <a:p>
             <a:fld id="{D2887149-AF03-6142-908A-3DD284EAF54B}" type="datetimeFigureOut">
               <a:rPr lang="en-US" smtClean="0"/>
-              <a:t>11/8/21</a:t>
+              <a:t>1/16/24</a:t>
             </a:fld>
             <a:endParaRPr lang="en-US"/>
           </a:p>
@@ -547,7 +547,7 @@
             <a:fld id="{0B25AC41-3BEC-9247-8322-91B80C013F2D}" type="datetimeFigureOut">
               <a:rPr lang="en-US" smtClean="0"/>
               <a:pPr/>
-              <a:t>11/8/21</a:t>
+              <a:t>1/16/24</a:t>
             </a:fld>
             <a:endParaRPr lang="en-US" dirty="0"/>
           </a:p>
@@ -1034,7 +1034,7 @@
             <a:fld id="{CA8E1BB1-B036-4140-B110-296DC0701D04}" type="datetime8">
               <a:rPr lang="en-US" smtClean="0"/>
               <a:pPr/>
-              <a:t>11/8/21 6:41 PM</a:t>
+              <a:t>1/16/24 12:16 PM</a:t>
             </a:fld>
             <a:endParaRPr lang="en-US" dirty="0"/>
           </a:p>
@@ -1413,7 +1413,7 @@
                 <a:ea typeface="Amazon Ember" panose="020B0603020204020204" pitchFamily="34" charset="0"/>
                 <a:cs typeface="Amazon Ember" panose="020B0603020204020204" pitchFamily="34" charset="0"/>
               </a:rPr>
-              <a:t>© 2021, Amazon Web Services, Inc. or its Affiliates. </a:t>
+              <a:t>© 2024, Amazon Web Services, Inc. or its Affiliates. </a:t>
             </a:r>
           </a:p>
         </p:txBody>
@@ -5317,7 +5317,7 @@
                 <a:ea typeface="Amazon Ember" panose="020B0603020204020204" pitchFamily="34" charset="0"/>
                 <a:cs typeface="Amazon Ember" panose="020B0603020204020204" pitchFamily="34" charset="0"/>
               </a:rPr>
-              <a:t>© 2021, Amazon Web Services, Inc. or its Affiliates. </a:t>
+              <a:t>© 2024, Amazon Web Services, Inc. or its Affiliates. </a:t>
             </a:r>
           </a:p>
         </p:txBody>
@@ -6054,7 +6054,7 @@
                 <a:ea typeface="Amazon Ember" panose="020B0603020204020204" pitchFamily="34" charset="0"/>
                 <a:cs typeface="Amazon Ember" panose="020B0603020204020204" pitchFamily="34" charset="0"/>
               </a:rPr>
-              <a:t>© 2021, Amazon Web Services, Inc. or its Affiliates. </a:t>
+              <a:t>© 2024, Amazon Web Services, Inc. or its Affiliates. </a:t>
             </a:r>
           </a:p>
         </p:txBody>
@@ -7023,7 +7023,7 @@
                 <a:ea typeface="Amazon Ember" panose="020B0603020204020204" pitchFamily="34" charset="0"/>
                 <a:cs typeface="Amazon Ember" panose="020B0603020204020204" pitchFamily="34" charset="0"/>
               </a:rPr>
-              <a:t>© 2021, Amazon Web Services, Inc. or its Affiliates. </a:t>
+              <a:t>© 2024, Amazon Web Services, Inc. or its Affiliates. </a:t>
             </a:r>
           </a:p>
         </p:txBody>
@@ -7211,7 +7211,7 @@
                 <a:ea typeface="Amazon Ember" panose="020B0603020204020204" pitchFamily="34" charset="0"/>
                 <a:cs typeface="Amazon Ember" panose="020B0603020204020204" pitchFamily="34" charset="0"/>
               </a:rPr>
-              <a:t>© 2021, Amazon Web Services, Inc. or its Affiliates. </a:t>
+              <a:t>© 2024, Amazon Web Services, Inc. or its Affiliates. </a:t>
             </a:r>
           </a:p>
         </p:txBody>
@@ -7369,7 +7369,7 @@
                 <a:ea typeface="Amazon Ember" panose="020B0603020204020204" pitchFamily="34" charset="0"/>
                 <a:cs typeface="Amazon Ember" panose="020B0603020204020204" pitchFamily="34" charset="0"/>
               </a:rPr>
-              <a:t>© 2021, Amazon Web Services, Inc. or its Affiliates. </a:t>
+              <a:t>© 2024, Amazon Web Services, Inc. or its Affiliates. </a:t>
             </a:r>
           </a:p>
         </p:txBody>
@@ -7582,7 +7582,7 @@
                 <a:ea typeface="Amazon Ember" panose="020B0603020204020204" pitchFamily="34" charset="0"/>
                 <a:cs typeface="Amazon Ember" panose="020B0603020204020204" pitchFamily="34" charset="0"/>
               </a:rPr>
-              <a:t>© 2021, Amazon Web Services, Inc. or its Affiliates. </a:t>
+              <a:t>© 2024, Amazon Web Services, Inc. or its Affiliates. </a:t>
             </a:r>
           </a:p>
         </p:txBody>
@@ -8185,7 +8185,7 @@
           <a:p>
             <a:r>
               <a:rPr lang="en-US" sz="2000" dirty="0"/>
-              <a:t>Amazon Web Services EMEA</a:t>
+              <a:t>Amazon Web Services</a:t>
             </a:r>
           </a:p>
         </p:txBody>
@@ -10888,7 +10888,7 @@
         </p:blipFill>
         <p:spPr>
           <a:xfrm>
-            <a:off x="4208855" y="5960796"/>
+            <a:off x="5176264" y="6119821"/>
             <a:ext cx="469900" cy="469900"/>
           </a:xfrm>
           <a:prstGeom prst="rect">
@@ -10910,7 +10910,7 @@
         </p:nvSpPr>
         <p:spPr>
           <a:xfrm>
-            <a:off x="3606623" y="6460632"/>
+            <a:off x="4574032" y="6619657"/>
             <a:ext cx="1681689" cy="738664"/>
           </a:xfrm>
           <a:prstGeom prst="rect">
@@ -10946,7 +10946,7 @@
         </p:nvSpPr>
         <p:spPr>
           <a:xfrm>
-            <a:off x="3335433" y="2295368"/>
+            <a:off x="3928170" y="2335892"/>
             <a:ext cx="2212547" cy="523220"/>
           </a:xfrm>
           <a:prstGeom prst="rect">
@@ -10970,7 +10970,7 @@
             </a:br>
             <a:r>
               <a:rPr lang="en-US" sz="1400" dirty="0"/>
-              <a:t>Studio</a:t>
+              <a:t>Studio Code Editor</a:t>
             </a:r>
           </a:p>
         </p:txBody>
@@ -11003,7 +11003,7 @@
         </p:blipFill>
         <p:spPr>
           <a:xfrm>
-            <a:off x="4086106" y="1522864"/>
+            <a:off x="4680942" y="1521062"/>
             <a:ext cx="711200" cy="711200"/>
           </a:xfrm>
           <a:prstGeom prst="rect">
@@ -11025,7 +11025,7 @@
         </p:nvSpPr>
         <p:spPr>
           <a:xfrm>
-            <a:off x="5895464" y="5014310"/>
+            <a:off x="6862873" y="5173335"/>
             <a:ext cx="2212547" cy="523220"/>
           </a:xfrm>
           <a:prstGeom prst="rect">
@@ -11042,18 +11042,14 @@
             <a:pPr algn="ctr"/>
             <a:r>
               <a:rPr lang="en-US" sz="1400" dirty="0"/>
-              <a:t>Amazon </a:t>
-            </a:r>
-            <a:r>
-              <a:rPr lang="en-US" sz="1400" dirty="0" err="1"/>
-              <a:t>SageMaker</a:t>
+              <a:t>Amazon SageMaker</a:t>
             </a:r>
             <a:br>
               <a:rPr lang="en-US" sz="1400" dirty="0"/>
             </a:br>
             <a:r>
               <a:rPr lang="en-US" sz="1400" dirty="0"/>
-              <a:t>Training</a:t>
+              <a:t>Training (training job)</a:t>
             </a:r>
           </a:p>
         </p:txBody>
@@ -11086,7 +11082,7 @@
         </p:blipFill>
         <p:spPr>
           <a:xfrm>
-            <a:off x="6658756" y="4241806"/>
+            <a:off x="7626165" y="4400831"/>
             <a:ext cx="711200" cy="711200"/>
           </a:xfrm>
           <a:prstGeom prst="rect">
@@ -11108,7 +11104,7 @@
         </p:nvSpPr>
         <p:spPr>
           <a:xfrm>
-            <a:off x="8410064" y="5014310"/>
+            <a:off x="9377473" y="5173335"/>
             <a:ext cx="2212547" cy="523220"/>
           </a:xfrm>
           <a:prstGeom prst="rect">
@@ -11169,7 +11165,7 @@
         </p:blipFill>
         <p:spPr>
           <a:xfrm>
-            <a:off x="9154306" y="4241806"/>
+            <a:off x="10121715" y="4400831"/>
             <a:ext cx="711200" cy="711200"/>
           </a:xfrm>
           <a:prstGeom prst="rect">
@@ -11191,7 +11187,7 @@
         </p:nvSpPr>
         <p:spPr>
           <a:xfrm>
-            <a:off x="10919459" y="5000739"/>
+            <a:off x="11947658" y="4388968"/>
             <a:ext cx="2301904" cy="307777"/>
           </a:xfrm>
           <a:prstGeom prst="rect">
@@ -11241,7 +11237,7 @@
         </p:blipFill>
         <p:spPr>
           <a:xfrm>
-            <a:off x="11714811" y="4242647"/>
+            <a:off x="12743010" y="3630876"/>
             <a:ext cx="711200" cy="711200"/>
           </a:xfrm>
           <a:prstGeom prst="rect">
@@ -11277,7 +11273,7 @@
         </p:blipFill>
         <p:spPr>
           <a:xfrm>
-            <a:off x="11835461" y="2301517"/>
+            <a:off x="12863660" y="1689746"/>
             <a:ext cx="469900" cy="469900"/>
           </a:xfrm>
           <a:prstGeom prst="rect">
@@ -11299,7 +11295,7 @@
         </p:nvSpPr>
         <p:spPr>
           <a:xfrm>
-            <a:off x="11118297" y="2839082"/>
+            <a:off x="12146496" y="2227311"/>
             <a:ext cx="1904228" cy="523220"/>
           </a:xfrm>
           <a:prstGeom prst="rect">
@@ -11349,7 +11345,7 @@
         </p:blipFill>
         <p:spPr>
           <a:xfrm>
-            <a:off x="11714811" y="6105032"/>
+            <a:off x="12743010" y="5493261"/>
             <a:ext cx="711200" cy="711200"/>
           </a:xfrm>
           <a:prstGeom prst="rect">
@@ -11371,7 +11367,7 @@
         </p:nvSpPr>
         <p:spPr>
           <a:xfrm>
-            <a:off x="11317135" y="6816232"/>
+            <a:off x="12345334" y="6204461"/>
             <a:ext cx="1506552" cy="307777"/>
           </a:xfrm>
           <a:prstGeom prst="rect">
@@ -11407,8 +11403,8 @@
         </p:nvSpPr>
         <p:spPr>
           <a:xfrm>
-            <a:off x="661782" y="2257611"/>
-            <a:ext cx="1691411" cy="307777"/>
+            <a:off x="2131985" y="2307007"/>
+            <a:ext cx="1691411" cy="738664"/>
           </a:xfrm>
           <a:prstGeom prst="rect">
             <a:avLst/>
@@ -11428,47 +11424,24 @@
                 <a:ea typeface="Amazon Ember" panose="020B0603020204020204" pitchFamily="34" charset="0"/>
                 <a:cs typeface="Amazon Ember" panose="020B0603020204020204" pitchFamily="34" charset="0"/>
               </a:rPr>
-              <a:t>Amazon Athena</a:t>
-            </a:r>
-          </a:p>
-        </p:txBody>
-      </p:sp>
-      <p:pic>
-        <p:nvPicPr>
-          <p:cNvPr id="24" name="Graphic 23">
-            <a:extLst>
-              <a:ext uri="{FF2B5EF4-FFF2-40B4-BE49-F238E27FC236}">
-                <a16:creationId xmlns:a16="http://schemas.microsoft.com/office/drawing/2014/main" id="{73D5AF1A-8275-A54D-AD5C-EAB19D998000}"/>
-              </a:ext>
-            </a:extLst>
-          </p:cNvPr>
-          <p:cNvPicPr>
-            <a:picLocks noChangeAspect="1"/>
-          </p:cNvPicPr>
-          <p:nvPr/>
-        </p:nvPicPr>
-        <p:blipFill>
-          <a:blip r:embed="rId10">
-            <a:extLst>
-              <a:ext uri="{96DAC541-7B7A-43D3-8B79-37D633B846F1}">
-                <asvg:svgBlip xmlns:asvg="http://schemas.microsoft.com/office/drawing/2016/SVG/main" r:embed="rId11"/>
-              </a:ext>
-            </a:extLst>
-          </a:blip>
-          <a:stretch>
-            <a:fillRect/>
-          </a:stretch>
-        </p:blipFill>
-        <p:spPr>
-          <a:xfrm>
-            <a:off x="1151887" y="1522864"/>
-            <a:ext cx="711200" cy="711200"/>
-          </a:xfrm>
-          <a:prstGeom prst="rect">
-            <a:avLst/>
-          </a:prstGeom>
-        </p:spPr>
-      </p:pic>
+              <a:t>Amazon SageMaker Studio </a:t>
+            </a:r>
+            <a:r>
+              <a:rPr lang="en-US" sz="1400" dirty="0" err="1">
+                <a:latin typeface="+mj-lt"/>
+                <a:ea typeface="Amazon Ember" panose="020B0603020204020204" pitchFamily="34" charset="0"/>
+                <a:cs typeface="Amazon Ember" panose="020B0603020204020204" pitchFamily="34" charset="0"/>
+              </a:rPr>
+              <a:t>JupyterLab</a:t>
+            </a:r>
+            <a:endParaRPr lang="en-US" sz="1400" dirty="0">
+              <a:latin typeface="+mj-lt"/>
+              <a:ea typeface="Amazon Ember" panose="020B0603020204020204" pitchFamily="34" charset="0"/>
+              <a:cs typeface="Amazon Ember" panose="020B0603020204020204" pitchFamily="34" charset="0"/>
+            </a:endParaRPr>
+          </a:p>
+        </p:txBody>
+      </p:sp>
       <p:cxnSp>
         <p:nvCxnSpPr>
           <p:cNvPr id="53" name="Elbow Connector 52">
@@ -11486,7 +11459,7 @@
         </p:nvCxnSpPr>
         <p:spPr>
           <a:xfrm flipV="1">
-            <a:off x="4678755" y="5537530"/>
+            <a:off x="5646164" y="5696555"/>
             <a:ext cx="4837583" cy="658216"/>
           </a:xfrm>
           <a:prstGeom prst="bentConnector2">
@@ -11529,52 +11502,8 @@
         </p:nvCxnSpPr>
         <p:spPr>
           <a:xfrm flipV="1">
-            <a:off x="4678755" y="5537530"/>
+            <a:off x="5646164" y="5696555"/>
             <a:ext cx="2322983" cy="658216"/>
-          </a:xfrm>
-          <a:prstGeom prst="bentConnector2">
-            <a:avLst/>
-          </a:prstGeom>
-          <a:ln>
-            <a:headEnd type="triangle"/>
-            <a:tailEnd type="triangle"/>
-          </a:ln>
-        </p:spPr>
-        <p:style>
-          <a:lnRef idx="2">
-            <a:schemeClr val="accent1"/>
-          </a:lnRef>
-          <a:fillRef idx="0">
-            <a:schemeClr val="accent1"/>
-          </a:fillRef>
-          <a:effectRef idx="1">
-            <a:schemeClr val="accent1"/>
-          </a:effectRef>
-          <a:fontRef idx="minor">
-            <a:schemeClr val="tx1"/>
-          </a:fontRef>
-        </p:style>
-      </p:cxnSp>
-      <p:cxnSp>
-        <p:nvCxnSpPr>
-          <p:cNvPr id="56" name="Elbow Connector 55">
-            <a:extLst>
-              <a:ext uri="{FF2B5EF4-FFF2-40B4-BE49-F238E27FC236}">
-                <a16:creationId xmlns:a16="http://schemas.microsoft.com/office/drawing/2014/main" id="{B9E139E0-E2E0-9445-9C8C-791104B6329B}"/>
-              </a:ext>
-            </a:extLst>
-          </p:cNvPr>
-          <p:cNvCxnSpPr>
-            <a:cxnSpLocks/>
-            <a:stCxn id="6" idx="1"/>
-            <a:endCxn id="23" idx="2"/>
-          </p:cNvCxnSpPr>
-          <p:nvPr/>
-        </p:nvCxnSpPr>
-        <p:spPr>
-          <a:xfrm rot="10800000">
-            <a:off x="1507489" y="2565388"/>
-            <a:ext cx="2701367" cy="3630358"/>
           </a:xfrm>
           <a:prstGeom prst="bentConnector2">
             <a:avLst/>
@@ -11617,8 +11546,8 @@
         </p:nvCxnSpPr>
         <p:spPr>
           <a:xfrm rot="10800000">
-            <a:off x="9865507" y="4597406"/>
-            <a:ext cx="1849305" cy="1863226"/>
+            <a:off x="10832916" y="4756431"/>
+            <a:ext cx="1910095" cy="1092430"/>
           </a:xfrm>
           <a:prstGeom prst="bentConnector3">
             <a:avLst>
@@ -11662,7 +11591,7 @@
         </p:nvCxnSpPr>
         <p:spPr>
           <a:xfrm flipV="1">
-            <a:off x="12070411" y="5308516"/>
+            <a:off x="13098610" y="4696745"/>
             <a:ext cx="0" cy="796516"/>
           </a:xfrm>
           <a:prstGeom prst="straightConnector1">
@@ -11702,7 +11631,7 @@
         </p:nvSpPr>
         <p:spPr>
           <a:xfrm>
-            <a:off x="7128509" y="7214613"/>
+            <a:off x="8095918" y="7373638"/>
             <a:ext cx="2301904" cy="523220"/>
           </a:xfrm>
           <a:prstGeom prst="rect">
@@ -11739,10 +11668,10 @@
           <p:nvPr/>
         </p:nvPicPr>
         <p:blipFill>
-          <a:blip r:embed="rId12">
+          <a:blip r:embed="rId10">
             <a:extLst>
               <a:ext uri="{96DAC541-7B7A-43D3-8B79-37D633B846F1}">
-                <asvg:svgBlip xmlns:asvg="http://schemas.microsoft.com/office/drawing/2016/SVG/main" r:embed="rId13"/>
+                <asvg:svgBlip xmlns:asvg="http://schemas.microsoft.com/office/drawing/2016/SVG/main" r:embed="rId11"/>
               </a:ext>
             </a:extLst>
           </a:blip>
@@ -11752,7 +11681,7 @@
         </p:blipFill>
         <p:spPr>
           <a:xfrm>
-            <a:off x="7923861" y="6542158"/>
+            <a:off x="8891270" y="6701183"/>
             <a:ext cx="711200" cy="711200"/>
           </a:xfrm>
           <a:prstGeom prst="rect">
@@ -11778,7 +11707,7 @@
         </p:nvCxnSpPr>
         <p:spPr>
           <a:xfrm rot="10800000" flipV="1">
-            <a:off x="8279462" y="4597406"/>
+            <a:off x="9246871" y="4756431"/>
             <a:ext cx="874845" cy="1944752"/>
           </a:xfrm>
           <a:prstGeom prst="bentConnector2">
@@ -11828,7 +11757,7 @@
         </p:nvCxnSpPr>
         <p:spPr>
           <a:xfrm>
-            <a:off x="7369956" y="4597406"/>
+            <a:off x="8337365" y="4756431"/>
             <a:ext cx="909505" cy="1944752"/>
           </a:xfrm>
           <a:prstGeom prst="bentConnector2">
@@ -11872,14 +11801,14 @@
           <p:cNvCxnSpPr>
             <a:cxnSpLocks/>
             <a:stCxn id="54" idx="0"/>
-            <a:endCxn id="8" idx="2"/>
+            <a:endCxn id="23" idx="2"/>
           </p:cNvCxnSpPr>
           <p:nvPr/>
         </p:nvCxnSpPr>
         <p:spPr>
-          <a:xfrm rot="5400000" flipH="1" flipV="1">
-            <a:off x="3725894" y="3530108"/>
-            <a:ext cx="1427332" cy="4293"/>
+          <a:xfrm rot="16200000" flipV="1">
+            <a:off x="3511620" y="2511742"/>
+            <a:ext cx="1359274" cy="2427132"/>
           </a:xfrm>
           <a:prstGeom prst="bentConnector3">
             <a:avLst>
@@ -11925,14 +11854,14 @@
           <p:cNvCxnSpPr>
             <a:cxnSpLocks/>
             <a:stCxn id="14" idx="0"/>
-            <a:endCxn id="8" idx="2"/>
+            <a:endCxn id="23" idx="2"/>
           </p:cNvCxnSpPr>
           <p:nvPr/>
         </p:nvCxnSpPr>
         <p:spPr>
           <a:xfrm rot="16200000" flipV="1">
-            <a:off x="5016423" y="2243872"/>
-            <a:ext cx="1423218" cy="2572649"/>
+            <a:off x="4802148" y="1221214"/>
+            <a:ext cx="1355160" cy="5004074"/>
           </a:xfrm>
           <a:prstGeom prst="bentConnector3">
             <a:avLst>
@@ -11978,19 +11907,17 @@
           <p:cNvCxnSpPr>
             <a:cxnSpLocks/>
             <a:stCxn id="16" idx="0"/>
-            <a:endCxn id="8" idx="2"/>
+            <a:endCxn id="9" idx="3"/>
           </p:cNvCxnSpPr>
           <p:nvPr/>
         </p:nvCxnSpPr>
         <p:spPr>
           <a:xfrm rot="16200000" flipV="1">
-            <a:off x="6264198" y="996097"/>
-            <a:ext cx="1423218" cy="5068199"/>
-          </a:xfrm>
-          <a:prstGeom prst="bentConnector3">
-            <a:avLst>
-              <a:gd name="adj1" fmla="val 50000"/>
-            </a:avLst>
+            <a:off x="6672645" y="596160"/>
+            <a:ext cx="2524169" cy="5085173"/>
+          </a:xfrm>
+          <a:prstGeom prst="bentConnector2">
+            <a:avLst/>
           </a:prstGeom>
           <a:ln w="12700">
             <a:solidFill>
@@ -12033,8 +11960,8 @@
         </p:nvSpPr>
         <p:spPr>
           <a:xfrm>
-            <a:off x="661782" y="1170203"/>
-            <a:ext cx="4761515" cy="1632800"/>
+            <a:off x="1976566" y="1402667"/>
+            <a:ext cx="4164152" cy="1722698"/>
           </a:xfrm>
           <a:prstGeom prst="rect">
             <a:avLst/>
@@ -12079,7 +12006,7 @@
                   <a:schemeClr val="tx1"/>
                 </a:solidFill>
               </a:rPr>
-              <a:t>Data Exploration, Data Visualization &amp; Analysis</a:t>
+              <a:t>IDEs</a:t>
             </a:r>
           </a:p>
         </p:txBody>
@@ -12102,7 +12029,7 @@
         </p:nvCxnSpPr>
         <p:spPr>
           <a:xfrm flipV="1">
-            <a:off x="12070411" y="3362302"/>
+            <a:off x="13098610" y="2750531"/>
             <a:ext cx="0" cy="880345"/>
           </a:xfrm>
           <a:prstGeom prst="straightConnector1">
@@ -12142,7 +12069,7 @@
         </p:nvSpPr>
         <p:spPr>
           <a:xfrm>
-            <a:off x="3337540" y="5016231"/>
+            <a:off x="4304949" y="5175256"/>
             <a:ext cx="2212547" cy="523220"/>
           </a:xfrm>
           <a:prstGeom prst="rect">
@@ -12166,7 +12093,7 @@
             </a:br>
             <a:r>
               <a:rPr lang="en-US" sz="1400" dirty="0"/>
-              <a:t>Processing</a:t>
+              <a:t>Training (data prep job)</a:t>
             </a:r>
           </a:p>
         </p:txBody>
@@ -12189,7 +12116,7 @@
         </p:nvCxnSpPr>
         <p:spPr>
           <a:xfrm rot="5400000" flipH="1" flipV="1">
-            <a:off x="4233137" y="5750120"/>
+            <a:off x="5200546" y="5909145"/>
             <a:ext cx="421345" cy="9"/>
           </a:xfrm>
           <a:prstGeom prst="bentConnector3">
@@ -12245,7 +12172,7 @@
         </p:blipFill>
         <p:spPr>
           <a:xfrm>
-            <a:off x="4081814" y="4245920"/>
+            <a:off x="5049223" y="4404945"/>
             <a:ext cx="711200" cy="711200"/>
           </a:xfrm>
           <a:prstGeom prst="rect">
@@ -12267,8 +12194,8 @@
         </p:nvSpPr>
         <p:spPr>
           <a:xfrm>
-            <a:off x="3325344" y="3155665"/>
-            <a:ext cx="7196439" cy="2366280"/>
+            <a:off x="4292753" y="3314689"/>
+            <a:ext cx="7196439" cy="2503593"/>
           </a:xfrm>
           <a:prstGeom prst="rect">
             <a:avLst/>
@@ -12320,57 +12247,6 @@
       </p:sp>
       <p:cxnSp>
         <p:nvCxnSpPr>
-          <p:cNvPr id="70" name="Straight Arrow Connector 69">
-            <a:extLst>
-              <a:ext uri="{FF2B5EF4-FFF2-40B4-BE49-F238E27FC236}">
-                <a16:creationId xmlns:a16="http://schemas.microsoft.com/office/drawing/2014/main" id="{DA450F3F-5628-B443-8152-8D996C1EE45F}"/>
-              </a:ext>
-            </a:extLst>
-          </p:cNvPr>
-          <p:cNvCxnSpPr>
-            <a:cxnSpLocks/>
-            <a:stCxn id="24" idx="3"/>
-            <a:endCxn id="9" idx="1"/>
-          </p:cNvCxnSpPr>
-          <p:nvPr/>
-        </p:nvCxnSpPr>
-        <p:spPr>
-          <a:xfrm>
-            <a:off x="1863087" y="1878464"/>
-            <a:ext cx="2223019" cy="0"/>
-          </a:xfrm>
-          <a:prstGeom prst="straightConnector1">
-            <a:avLst/>
-          </a:prstGeom>
-          <a:ln w="12700">
-            <a:solidFill>
-              <a:schemeClr val="tx1">
-                <a:lumMod val="50000"/>
-              </a:schemeClr>
-            </a:solidFill>
-            <a:prstDash val="sysDot"/>
-            <a:headEnd type="triangle"/>
-            <a:tailEnd type="triangle"/>
-          </a:ln>
-          <a:effectLst/>
-        </p:spPr>
-        <p:style>
-          <a:lnRef idx="2">
-            <a:schemeClr val="accent1"/>
-          </a:lnRef>
-          <a:fillRef idx="0">
-            <a:schemeClr val="accent1"/>
-          </a:fillRef>
-          <a:effectRef idx="1">
-            <a:schemeClr val="accent1"/>
-          </a:effectRef>
-          <a:fontRef idx="minor">
-            <a:schemeClr val="tx1"/>
-          </a:fontRef>
-        </p:style>
-      </p:cxnSp>
-      <p:cxnSp>
-        <p:nvCxnSpPr>
           <p:cNvPr id="48" name="Elbow Connector 47">
             <a:extLst>
               <a:ext uri="{FF2B5EF4-FFF2-40B4-BE49-F238E27FC236}">
@@ -12387,7 +12263,7 @@
         </p:nvCxnSpPr>
         <p:spPr>
           <a:xfrm>
-            <a:off x="4793014" y="4601520"/>
+            <a:off x="5760423" y="4760545"/>
             <a:ext cx="3130847" cy="2296238"/>
           </a:xfrm>
           <a:prstGeom prst="bentConnector3">
@@ -12449,7 +12325,7 @@
         </p:blipFill>
         <p:spPr>
           <a:xfrm>
-            <a:off x="9822360" y="2428696"/>
+            <a:off x="10789769" y="2587721"/>
             <a:ext cx="711200" cy="711200"/>
           </a:xfrm>
           <a:prstGeom prst="rect">
@@ -12471,7 +12347,7 @@
         </p:nvSpPr>
         <p:spPr>
           <a:xfrm>
-            <a:off x="7803298" y="2552263"/>
+            <a:off x="8468629" y="2696320"/>
             <a:ext cx="2212547" cy="523220"/>
           </a:xfrm>
           <a:prstGeom prst="rect">
@@ -12504,6 +12380,405 @@
           </a:p>
         </p:txBody>
       </p:sp>
+      <p:pic>
+        <p:nvPicPr>
+          <p:cNvPr id="3" name="Graphic 2">
+            <a:extLst>
+              <a:ext uri="{FF2B5EF4-FFF2-40B4-BE49-F238E27FC236}">
+                <a16:creationId xmlns:a16="http://schemas.microsoft.com/office/drawing/2014/main" id="{90F23D3C-9D4F-4AB1-547D-4629AA216290}"/>
+              </a:ext>
+            </a:extLst>
+          </p:cNvPr>
+          <p:cNvPicPr>
+            <a:picLocks noChangeAspect="1"/>
+          </p:cNvPicPr>
+          <p:nvPr/>
+        </p:nvPicPr>
+        <p:blipFill>
+          <a:blip r:embed="rId4">
+            <a:extLst>
+              <a:ext uri="{96DAC541-7B7A-43D3-8B79-37D633B846F1}">
+                <asvg:svgBlip xmlns:asvg="http://schemas.microsoft.com/office/drawing/2016/SVG/main" r:embed="rId5"/>
+              </a:ext>
+            </a:extLst>
+          </a:blip>
+          <a:stretch>
+            <a:fillRect/>
+          </a:stretch>
+        </p:blipFill>
+        <p:spPr>
+          <a:xfrm>
+            <a:off x="2622090" y="1516112"/>
+            <a:ext cx="711200" cy="711200"/>
+          </a:xfrm>
+          <a:prstGeom prst="rect">
+            <a:avLst/>
+          </a:prstGeom>
+        </p:spPr>
+      </p:pic>
+      <p:cxnSp>
+        <p:nvCxnSpPr>
+          <p:cNvPr id="28" name="Elbow Connector 27">
+            <a:extLst>
+              <a:ext uri="{FF2B5EF4-FFF2-40B4-BE49-F238E27FC236}">
+                <a16:creationId xmlns:a16="http://schemas.microsoft.com/office/drawing/2014/main" id="{01E2F8E8-86AB-01B5-E057-09E8D9301150}"/>
+              </a:ext>
+            </a:extLst>
+          </p:cNvPr>
+          <p:cNvCxnSpPr>
+            <a:cxnSpLocks/>
+            <a:stCxn id="39" idx="0"/>
+            <a:endCxn id="9" idx="3"/>
+          </p:cNvCxnSpPr>
+          <p:nvPr/>
+        </p:nvCxnSpPr>
+        <p:spPr>
+          <a:xfrm rot="16200000" flipV="1">
+            <a:off x="7913227" y="-644422"/>
+            <a:ext cx="711059" cy="5753227"/>
+          </a:xfrm>
+          <a:prstGeom prst="bentConnector2">
+            <a:avLst/>
+          </a:prstGeom>
+          <a:ln w="12700">
+            <a:solidFill>
+              <a:schemeClr val="tx1">
+                <a:lumMod val="50000"/>
+              </a:schemeClr>
+            </a:solidFill>
+            <a:prstDash val="sysDot"/>
+            <a:headEnd type="triangle"/>
+            <a:tailEnd type="triangle"/>
+          </a:ln>
+          <a:effectLst/>
+        </p:spPr>
+        <p:style>
+          <a:lnRef idx="2">
+            <a:schemeClr val="accent1"/>
+          </a:lnRef>
+          <a:fillRef idx="0">
+            <a:schemeClr val="accent1"/>
+          </a:fillRef>
+          <a:effectRef idx="1">
+            <a:schemeClr val="accent1"/>
+          </a:effectRef>
+          <a:fontRef idx="minor">
+            <a:schemeClr val="tx1"/>
+          </a:fontRef>
+        </p:style>
+      </p:cxnSp>
+      <p:sp>
+        <p:nvSpPr>
+          <p:cNvPr id="31" name="Rectangle 30">
+            <a:extLst>
+              <a:ext uri="{FF2B5EF4-FFF2-40B4-BE49-F238E27FC236}">
+                <a16:creationId xmlns:a16="http://schemas.microsoft.com/office/drawing/2014/main" id="{5A92B92D-A83B-CFBA-41E9-AA77CF7DF69C}"/>
+              </a:ext>
+            </a:extLst>
+          </p:cNvPr>
+          <p:cNvSpPr/>
+          <p:nvPr/>
+        </p:nvSpPr>
+        <p:spPr>
+          <a:xfrm>
+            <a:off x="1976565" y="932768"/>
+            <a:ext cx="4164152" cy="467353"/>
+          </a:xfrm>
+          <a:prstGeom prst="rect">
+            <a:avLst/>
+          </a:prstGeom>
+          <a:solidFill>
+            <a:schemeClr val="accent2"/>
+          </a:solidFill>
+          <a:ln>
+            <a:noFill/>
+          </a:ln>
+        </p:spPr>
+        <p:style>
+          <a:lnRef idx="0">
+            <a:scrgbClr r="0" g="0" b="0"/>
+          </a:lnRef>
+          <a:fillRef idx="0">
+            <a:scrgbClr r="0" g="0" b="0"/>
+          </a:fillRef>
+          <a:effectRef idx="0">
+            <a:scrgbClr r="0" g="0" b="0"/>
+          </a:effectRef>
+          <a:fontRef idx="minor">
+            <a:schemeClr val="lt1"/>
+          </a:fontRef>
+        </p:style>
+        <p:txBody>
+          <a:bodyPr rtlCol="0" anchor="ctr"/>
+          <a:lstStyle/>
+          <a:p>
+            <a:pPr algn="ctr"/>
+            <a:r>
+              <a:rPr lang="en-US" sz="1400" dirty="0"/>
+              <a:t>Amazon SageMaker Studio</a:t>
+            </a:r>
+          </a:p>
+        </p:txBody>
+      </p:sp>
+      <p:pic>
+        <p:nvPicPr>
+          <p:cNvPr id="37" name="Graphic 21">
+            <a:extLst>
+              <a:ext uri="{FF2B5EF4-FFF2-40B4-BE49-F238E27FC236}">
+                <a16:creationId xmlns:a16="http://schemas.microsoft.com/office/drawing/2014/main" id="{D868C858-4056-B189-1275-6A7829F149B5}"/>
+              </a:ext>
+            </a:extLst>
+          </p:cNvPr>
+          <p:cNvPicPr>
+            <a:picLocks noChangeAspect="1" noChangeArrowheads="1"/>
+          </p:cNvPicPr>
+          <p:nvPr/>
+        </p:nvPicPr>
+        <p:blipFill>
+          <a:blip r:embed="rId12">
+            <a:extLst>
+              <a:ext uri="{96DAC541-7B7A-43D3-8B79-37D633B846F1}">
+                <asvg:svgBlip xmlns:asvg="http://schemas.microsoft.com/office/drawing/2016/SVG/main" r:embed="rId13"/>
+              </a:ext>
+            </a:extLst>
+          </a:blip>
+          <a:srcRect/>
+          <a:stretch/>
+        </p:blipFill>
+        <p:spPr bwMode="auto">
+          <a:xfrm>
+            <a:off x="740490" y="1636762"/>
+            <a:ext cx="469900" cy="469900"/>
+          </a:xfrm>
+          <a:prstGeom prst="rect">
+            <a:avLst/>
+          </a:prstGeom>
+          <a:noFill/>
+          <a:ln>
+            <a:noFill/>
+          </a:ln>
+          <a:extLst>
+            <a:ext uri="{909E8E84-426E-40DD-AFC4-6F175D3DCCD1}">
+              <a14:hiddenFill xmlns:a14="http://schemas.microsoft.com/office/drawing/2010/main">
+                <a:solidFill>
+                  <a:srgbClr val="FFFFFF"/>
+                </a:solidFill>
+              </a14:hiddenFill>
+            </a:ext>
+            <a:ext uri="{91240B29-F687-4F45-9708-019B960494DF}">
+              <a14:hiddenLine xmlns:a14="http://schemas.microsoft.com/office/drawing/2010/main" w="9525">
+                <a:solidFill>
+                  <a:srgbClr val="000000"/>
+                </a:solidFill>
+                <a:miter lim="800000"/>
+                <a:headEnd/>
+                <a:tailEnd/>
+              </a14:hiddenLine>
+            </a:ext>
+          </a:extLst>
+        </p:spPr>
+      </p:pic>
+      <p:sp>
+        <p:nvSpPr>
+          <p:cNvPr id="38" name="TextBox 38">
+            <a:extLst>
+              <a:ext uri="{FF2B5EF4-FFF2-40B4-BE49-F238E27FC236}">
+                <a16:creationId xmlns:a16="http://schemas.microsoft.com/office/drawing/2014/main" id="{A3263DF8-8B81-AA87-DE5B-E2674E9B34DC}"/>
+              </a:ext>
+            </a:extLst>
+          </p:cNvPr>
+          <p:cNvSpPr txBox="1">
+            <a:spLocks noChangeArrowheads="1"/>
+          </p:cNvSpPr>
+          <p:nvPr/>
+        </p:nvSpPr>
+        <p:spPr bwMode="auto">
+          <a:xfrm>
+            <a:off x="441367" y="2244110"/>
+            <a:ext cx="1073150" cy="261610"/>
+          </a:xfrm>
+          <a:prstGeom prst="rect">
+            <a:avLst/>
+          </a:prstGeom>
+          <a:noFill/>
+          <a:ln>
+            <a:noFill/>
+          </a:ln>
+          <a:extLst>
+            <a:ext uri="{909E8E84-426E-40DD-AFC4-6F175D3DCCD1}">
+              <a14:hiddenFill xmlns:a14="http://schemas.microsoft.com/office/drawing/2010/main">
+                <a:solidFill>
+                  <a:srgbClr val="FFFFFF"/>
+                </a:solidFill>
+              </a14:hiddenFill>
+            </a:ext>
+            <a:ext uri="{91240B29-F687-4F45-9708-019B960494DF}">
+              <a14:hiddenLine xmlns:a14="http://schemas.microsoft.com/office/drawing/2010/main" w="9525">
+                <a:solidFill>
+                  <a:srgbClr val="000000"/>
+                </a:solidFill>
+                <a:miter lim="800000"/>
+                <a:headEnd/>
+                <a:tailEnd/>
+              </a14:hiddenLine>
+            </a:ext>
+          </a:extLst>
+        </p:spPr>
+        <p:txBody>
+          <a:bodyPr>
+            <a:spAutoFit/>
+          </a:bodyPr>
+          <a:lstStyle>
+            <a:lvl1pPr>
+              <a:defRPr>
+                <a:solidFill>
+                  <a:schemeClr val="tx1"/>
+                </a:solidFill>
+                <a:latin typeface="Calibri" panose="020F0502020204030204" pitchFamily="34" charset="0"/>
+              </a:defRPr>
+            </a:lvl1pPr>
+            <a:lvl2pPr marL="742950" indent="-285750">
+              <a:defRPr>
+                <a:solidFill>
+                  <a:schemeClr val="tx1"/>
+                </a:solidFill>
+                <a:latin typeface="Calibri" panose="020F0502020204030204" pitchFamily="34" charset="0"/>
+              </a:defRPr>
+            </a:lvl2pPr>
+            <a:lvl3pPr marL="1143000" indent="-228600">
+              <a:defRPr>
+                <a:solidFill>
+                  <a:schemeClr val="tx1"/>
+                </a:solidFill>
+                <a:latin typeface="Calibri" panose="020F0502020204030204" pitchFamily="34" charset="0"/>
+              </a:defRPr>
+            </a:lvl3pPr>
+            <a:lvl4pPr marL="1600200" indent="-228600">
+              <a:defRPr>
+                <a:solidFill>
+                  <a:schemeClr val="tx1"/>
+                </a:solidFill>
+                <a:latin typeface="Calibri" panose="020F0502020204030204" pitchFamily="34" charset="0"/>
+              </a:defRPr>
+            </a:lvl4pPr>
+            <a:lvl5pPr marL="2057400" indent="-228600">
+              <a:defRPr>
+                <a:solidFill>
+                  <a:schemeClr val="tx1"/>
+                </a:solidFill>
+                <a:latin typeface="Calibri" panose="020F0502020204030204" pitchFamily="34" charset="0"/>
+              </a:defRPr>
+            </a:lvl5pPr>
+            <a:lvl6pPr marL="2514600" indent="-228600" eaLnBrk="0" fontAlgn="base" hangingPunct="0">
+              <a:spcBef>
+                <a:spcPct val="0"/>
+              </a:spcBef>
+              <a:spcAft>
+                <a:spcPct val="0"/>
+              </a:spcAft>
+              <a:defRPr>
+                <a:solidFill>
+                  <a:schemeClr val="tx1"/>
+                </a:solidFill>
+                <a:latin typeface="Calibri" panose="020F0502020204030204" pitchFamily="34" charset="0"/>
+              </a:defRPr>
+            </a:lvl6pPr>
+            <a:lvl7pPr marL="2971800" indent="-228600" eaLnBrk="0" fontAlgn="base" hangingPunct="0">
+              <a:spcBef>
+                <a:spcPct val="0"/>
+              </a:spcBef>
+              <a:spcAft>
+                <a:spcPct val="0"/>
+              </a:spcAft>
+              <a:defRPr>
+                <a:solidFill>
+                  <a:schemeClr val="tx1"/>
+                </a:solidFill>
+                <a:latin typeface="Calibri" panose="020F0502020204030204" pitchFamily="34" charset="0"/>
+              </a:defRPr>
+            </a:lvl7pPr>
+            <a:lvl8pPr marL="3429000" indent="-228600" eaLnBrk="0" fontAlgn="base" hangingPunct="0">
+              <a:spcBef>
+                <a:spcPct val="0"/>
+              </a:spcBef>
+              <a:spcAft>
+                <a:spcPct val="0"/>
+              </a:spcAft>
+              <a:defRPr>
+                <a:solidFill>
+                  <a:schemeClr val="tx1"/>
+                </a:solidFill>
+                <a:latin typeface="Calibri" panose="020F0502020204030204" pitchFamily="34" charset="0"/>
+              </a:defRPr>
+            </a:lvl8pPr>
+            <a:lvl9pPr marL="3886200" indent="-228600" eaLnBrk="0" fontAlgn="base" hangingPunct="0">
+              <a:spcBef>
+                <a:spcPct val="0"/>
+              </a:spcBef>
+              <a:spcAft>
+                <a:spcPct val="0"/>
+              </a:spcAft>
+              <a:defRPr>
+                <a:solidFill>
+                  <a:schemeClr val="tx1"/>
+                </a:solidFill>
+                <a:latin typeface="Calibri" panose="020F0502020204030204" pitchFamily="34" charset="0"/>
+              </a:defRPr>
+            </a:lvl9pPr>
+          </a:lstStyle>
+          <a:p>
+            <a:pPr algn="ctr" eaLnBrk="1" hangingPunct="1"/>
+            <a:r>
+              <a:rPr lang="en-US" altLang="en-US" sz="1100" dirty="0">
+                <a:latin typeface="Arial" panose="020B0604020202020204" pitchFamily="34" charset="0"/>
+                <a:cs typeface="Arial" panose="020B0604020202020204" pitchFamily="34" charset="0"/>
+              </a:rPr>
+              <a:t>User</a:t>
+            </a:r>
+          </a:p>
+        </p:txBody>
+      </p:sp>
+      <p:cxnSp>
+        <p:nvCxnSpPr>
+          <p:cNvPr id="46" name="Straight Arrow Connector 45">
+            <a:extLst>
+              <a:ext uri="{FF2B5EF4-FFF2-40B4-BE49-F238E27FC236}">
+                <a16:creationId xmlns:a16="http://schemas.microsoft.com/office/drawing/2014/main" id="{423D5B4F-1835-4239-3AFB-43029F14DA45}"/>
+              </a:ext>
+            </a:extLst>
+          </p:cNvPr>
+          <p:cNvCxnSpPr>
+            <a:stCxn id="37" idx="3"/>
+          </p:cNvCxnSpPr>
+          <p:nvPr/>
+        </p:nvCxnSpPr>
+        <p:spPr>
+          <a:xfrm>
+            <a:off x="1210390" y="1871712"/>
+            <a:ext cx="766175" cy="0"/>
+          </a:xfrm>
+          <a:prstGeom prst="straightConnector1">
+            <a:avLst/>
+          </a:prstGeom>
+          <a:ln>
+            <a:tailEnd type="triangle"/>
+          </a:ln>
+        </p:spPr>
+        <p:style>
+          <a:lnRef idx="2">
+            <a:schemeClr val="accent1"/>
+          </a:lnRef>
+          <a:fillRef idx="0">
+            <a:schemeClr val="accent1"/>
+          </a:fillRef>
+          <a:effectRef idx="1">
+            <a:schemeClr val="accent1"/>
+          </a:effectRef>
+          <a:fontRef idx="minor">
+            <a:schemeClr val="tx1"/>
+          </a:fontRef>
+        </p:style>
+      </p:cxnSp>
     </p:spTree>
     <p:extLst>
       <p:ext uri="{BB962C8B-B14F-4D97-AF65-F5344CB8AC3E}">
@@ -12927,7 +13202,7 @@
           <a:p>
             <a:r>
               <a:rPr lang="en-US" sz="2000" dirty="0"/>
-              <a:t>Amazon Web Services EMEA</a:t>
+              <a:t>Amazon Web Services</a:t>
             </a:r>
           </a:p>
         </p:txBody>
@@ -13855,21 +14130,6 @@
 </file>
 
 <file path=customXml/item1.xml><?xml version="1.0" encoding="utf-8"?>
-<?mso-contentType ?>
-<FormTemplates xmlns="http://schemas.microsoft.com/sharepoint/v3/contenttype/forms">
-  <Display>DocumentLibraryForm</Display>
-  <Edit>DocumentLibraryForm</Edit>
-  <New>DocumentLibraryForm</New>
-</FormTemplates>
-</file>
-
-<file path=customXml/item2.xml><?xml version="1.0" encoding="utf-8"?>
-<p:properties xmlns:p="http://schemas.microsoft.com/office/2006/metadata/properties" xmlns:xsi="http://www.w3.org/2001/XMLSchema-instance">
-  <documentManagement/>
-</p:properties>
-</file>
-
-<file path=customXml/item3.xml><?xml version="1.0" encoding="utf-8"?>
 <ct:contentTypeSchema xmlns:ct="http://schemas.microsoft.com/office/2006/metadata/contentType" xmlns:ma="http://schemas.microsoft.com/office/2006/metadata/properties/metaAttributes" ct:_="" ma:_="" ma:contentTypeName="Document" ma:contentTypeID="0x010100D26A3D6C04DFD740953BA1B2B9E62D60" ma:contentTypeVersion="0" ma:contentTypeDescription="Create a new document." ma:contentTypeScope="" ma:versionID="26617cd14cd3af163c0e97ff614e520a">
   <xsd:schema xmlns:xsd="http://www.w3.org/2001/XMLSchema" xmlns:xs="http://www.w3.org/2001/XMLSchema" xmlns:p="http://schemas.microsoft.com/office/2006/metadata/properties" targetNamespace="http://schemas.microsoft.com/office/2006/metadata/properties" ma:root="true" ma:fieldsID="c64490b4aec6201516c3a874156f37b2">
     <xsd:element name="properties">
@@ -13983,10 +14243,33 @@
 </ct:contentTypeSchema>
 </file>
 
+<file path=customXml/item2.xml><?xml version="1.0" encoding="utf-8"?>
+<p:properties xmlns:p="http://schemas.microsoft.com/office/2006/metadata/properties" xmlns:xsi="http://www.w3.org/2001/XMLSchema-instance">
+  <documentManagement/>
+</p:properties>
+</file>
+
+<file path=customXml/item3.xml><?xml version="1.0" encoding="utf-8"?>
+<?mso-contentType ?>
+<FormTemplates xmlns="http://schemas.microsoft.com/sharepoint/v3/contenttype/forms">
+  <Display>DocumentLibraryForm</Display>
+  <Edit>DocumentLibraryForm</Edit>
+  <New>DocumentLibraryForm</New>
+</FormTemplates>
+</file>
+
 <file path=customXml/itemProps1.xml><?xml version="1.0" encoding="utf-8"?>
-<ds:datastoreItem xmlns:ds="http://schemas.openxmlformats.org/officeDocument/2006/customXml" ds:itemID="{705B35A6-8B52-46A5-AE45-B98C6459DC10}">
+<ds:datastoreItem xmlns:ds="http://schemas.openxmlformats.org/officeDocument/2006/customXml" ds:itemID="{51A3258A-222C-4488-825E-7520D001FB75}">
   <ds:schemaRefs>
-    <ds:schemaRef ds:uri="http://schemas.microsoft.com/sharepoint/v3/contenttype/forms"/>
+    <ds:schemaRef ds:uri="http://schemas.microsoft.com/office/2006/metadata/contentType"/>
+    <ds:schemaRef ds:uri="http://schemas.microsoft.com/office/2006/metadata/properties/metaAttributes"/>
+    <ds:schemaRef ds:uri="http://www.w3.org/2001/XMLSchema"/>
+    <ds:schemaRef ds:uri="http://schemas.microsoft.com/office/2006/metadata/properties"/>
+    <ds:schemaRef ds:uri="http://schemas.openxmlformats.org/package/2006/metadata/core-properties"/>
+    <ds:schemaRef ds:uri="http://purl.org/dc/elements/1.1/"/>
+    <ds:schemaRef ds:uri="http://purl.org/dc/terms/"/>
+    <ds:schemaRef ds:uri="http://schemas.microsoft.com/internal/obd"/>
+    <ds:schemaRef ds:uri="http://schemas.microsoft.com/office/infopath/2007/PartnerControls"/>
   </ds:schemaRefs>
 </ds:datastoreItem>
 </file>
@@ -14007,17 +14290,9 @@
 </file>
 
 <file path=customXml/itemProps3.xml><?xml version="1.0" encoding="utf-8"?>
-<ds:datastoreItem xmlns:ds="http://schemas.openxmlformats.org/officeDocument/2006/customXml" ds:itemID="{51A3258A-222C-4488-825E-7520D001FB75}">
+<ds:datastoreItem xmlns:ds="http://schemas.openxmlformats.org/officeDocument/2006/customXml" ds:itemID="{705B35A6-8B52-46A5-AE45-B98C6459DC10}">
   <ds:schemaRefs>
-    <ds:schemaRef ds:uri="http://schemas.microsoft.com/office/2006/metadata/contentType"/>
-    <ds:schemaRef ds:uri="http://schemas.microsoft.com/office/2006/metadata/properties/metaAttributes"/>
-    <ds:schemaRef ds:uri="http://www.w3.org/2001/XMLSchema"/>
-    <ds:schemaRef ds:uri="http://schemas.microsoft.com/office/2006/metadata/properties"/>
-    <ds:schemaRef ds:uri="http://schemas.openxmlformats.org/package/2006/metadata/core-properties"/>
-    <ds:schemaRef ds:uri="http://purl.org/dc/elements/1.1/"/>
-    <ds:schemaRef ds:uri="http://purl.org/dc/terms/"/>
-    <ds:schemaRef ds:uri="http://schemas.microsoft.com/internal/obd"/>
-    <ds:schemaRef ds:uri="http://schemas.microsoft.com/office/infopath/2007/PartnerControls"/>
+    <ds:schemaRef ds:uri="http://schemas.microsoft.com/sharepoint/v3/contenttype/forms"/>
   </ds:schemaRefs>
 </ds:datastoreItem>
 </file>
</xml_diff>

<commit_message>
Merge new Studio and SDK experience (#22)
Merge new Studio and SDK experience, including:

SageMaker Studio UI
JupyterLab Spaces
CodeEditor Spaces
remote decorator for remote function execution as jobs
ModelBuilder for simplified model deployment and testing
step decorator for simplified SageMaker Pipeline definition
</commit_message>
<xml_diff>
--- a/slides/end-to-end-ml-sm.pptx
+++ b/slides/end-to-end-ml-sm.pptx
@@ -365,7 +365,7 @@
           <a:p>
             <a:fld id="{D2887149-AF03-6142-908A-3DD284EAF54B}" type="datetimeFigureOut">
               <a:rPr lang="en-US" smtClean="0"/>
-              <a:t>11/8/21</a:t>
+              <a:t>1/16/24</a:t>
             </a:fld>
             <a:endParaRPr lang="en-US"/>
           </a:p>
@@ -547,7 +547,7 @@
             <a:fld id="{0B25AC41-3BEC-9247-8322-91B80C013F2D}" type="datetimeFigureOut">
               <a:rPr lang="en-US" smtClean="0"/>
               <a:pPr/>
-              <a:t>11/8/21</a:t>
+              <a:t>1/16/24</a:t>
             </a:fld>
             <a:endParaRPr lang="en-US" dirty="0"/>
           </a:p>
@@ -1034,7 +1034,7 @@
             <a:fld id="{CA8E1BB1-B036-4140-B110-296DC0701D04}" type="datetime8">
               <a:rPr lang="en-US" smtClean="0"/>
               <a:pPr/>
-              <a:t>11/8/21 6:41 PM</a:t>
+              <a:t>1/16/24 12:16 PM</a:t>
             </a:fld>
             <a:endParaRPr lang="en-US" dirty="0"/>
           </a:p>
@@ -1413,7 +1413,7 @@
                 <a:ea typeface="Amazon Ember" panose="020B0603020204020204" pitchFamily="34" charset="0"/>
                 <a:cs typeface="Amazon Ember" panose="020B0603020204020204" pitchFamily="34" charset="0"/>
               </a:rPr>
-              <a:t>© 2021, Amazon Web Services, Inc. or its Affiliates. </a:t>
+              <a:t>© 2024, Amazon Web Services, Inc. or its Affiliates. </a:t>
             </a:r>
           </a:p>
         </p:txBody>
@@ -5317,7 +5317,7 @@
                 <a:ea typeface="Amazon Ember" panose="020B0603020204020204" pitchFamily="34" charset="0"/>
                 <a:cs typeface="Amazon Ember" panose="020B0603020204020204" pitchFamily="34" charset="0"/>
               </a:rPr>
-              <a:t>© 2021, Amazon Web Services, Inc. or its Affiliates. </a:t>
+              <a:t>© 2024, Amazon Web Services, Inc. or its Affiliates. </a:t>
             </a:r>
           </a:p>
         </p:txBody>
@@ -6054,7 +6054,7 @@
                 <a:ea typeface="Amazon Ember" panose="020B0603020204020204" pitchFamily="34" charset="0"/>
                 <a:cs typeface="Amazon Ember" panose="020B0603020204020204" pitchFamily="34" charset="0"/>
               </a:rPr>
-              <a:t>© 2021, Amazon Web Services, Inc. or its Affiliates. </a:t>
+              <a:t>© 2024, Amazon Web Services, Inc. or its Affiliates. </a:t>
             </a:r>
           </a:p>
         </p:txBody>
@@ -7023,7 +7023,7 @@
                 <a:ea typeface="Amazon Ember" panose="020B0603020204020204" pitchFamily="34" charset="0"/>
                 <a:cs typeface="Amazon Ember" panose="020B0603020204020204" pitchFamily="34" charset="0"/>
               </a:rPr>
-              <a:t>© 2021, Amazon Web Services, Inc. or its Affiliates. </a:t>
+              <a:t>© 2024, Amazon Web Services, Inc. or its Affiliates. </a:t>
             </a:r>
           </a:p>
         </p:txBody>
@@ -7211,7 +7211,7 @@
                 <a:ea typeface="Amazon Ember" panose="020B0603020204020204" pitchFamily="34" charset="0"/>
                 <a:cs typeface="Amazon Ember" panose="020B0603020204020204" pitchFamily="34" charset="0"/>
               </a:rPr>
-              <a:t>© 2021, Amazon Web Services, Inc. or its Affiliates. </a:t>
+              <a:t>© 2024, Amazon Web Services, Inc. or its Affiliates. </a:t>
             </a:r>
           </a:p>
         </p:txBody>
@@ -7369,7 +7369,7 @@
                 <a:ea typeface="Amazon Ember" panose="020B0603020204020204" pitchFamily="34" charset="0"/>
                 <a:cs typeface="Amazon Ember" panose="020B0603020204020204" pitchFamily="34" charset="0"/>
               </a:rPr>
-              <a:t>© 2021, Amazon Web Services, Inc. or its Affiliates. </a:t>
+              <a:t>© 2024, Amazon Web Services, Inc. or its Affiliates. </a:t>
             </a:r>
           </a:p>
         </p:txBody>
@@ -7582,7 +7582,7 @@
                 <a:ea typeface="Amazon Ember" panose="020B0603020204020204" pitchFamily="34" charset="0"/>
                 <a:cs typeface="Amazon Ember" panose="020B0603020204020204" pitchFamily="34" charset="0"/>
               </a:rPr>
-              <a:t>© 2021, Amazon Web Services, Inc. or its Affiliates. </a:t>
+              <a:t>© 2024, Amazon Web Services, Inc. or its Affiliates. </a:t>
             </a:r>
           </a:p>
         </p:txBody>
@@ -8185,7 +8185,7 @@
           <a:p>
             <a:r>
               <a:rPr lang="en-US" sz="2000" dirty="0"/>
-              <a:t>Amazon Web Services EMEA</a:t>
+              <a:t>Amazon Web Services</a:t>
             </a:r>
           </a:p>
         </p:txBody>
@@ -10888,7 +10888,7 @@
         </p:blipFill>
         <p:spPr>
           <a:xfrm>
-            <a:off x="4208855" y="5960796"/>
+            <a:off x="5176264" y="6119821"/>
             <a:ext cx="469900" cy="469900"/>
           </a:xfrm>
           <a:prstGeom prst="rect">
@@ -10910,7 +10910,7 @@
         </p:nvSpPr>
         <p:spPr>
           <a:xfrm>
-            <a:off x="3606623" y="6460632"/>
+            <a:off x="4574032" y="6619657"/>
             <a:ext cx="1681689" cy="738664"/>
           </a:xfrm>
           <a:prstGeom prst="rect">
@@ -10946,7 +10946,7 @@
         </p:nvSpPr>
         <p:spPr>
           <a:xfrm>
-            <a:off x="3335433" y="2295368"/>
+            <a:off x="3928170" y="2335892"/>
             <a:ext cx="2212547" cy="523220"/>
           </a:xfrm>
           <a:prstGeom prst="rect">
@@ -10970,7 +10970,7 @@
             </a:br>
             <a:r>
               <a:rPr lang="en-US" sz="1400" dirty="0"/>
-              <a:t>Studio</a:t>
+              <a:t>Studio Code Editor</a:t>
             </a:r>
           </a:p>
         </p:txBody>
@@ -11003,7 +11003,7 @@
         </p:blipFill>
         <p:spPr>
           <a:xfrm>
-            <a:off x="4086106" y="1522864"/>
+            <a:off x="4680942" y="1521062"/>
             <a:ext cx="711200" cy="711200"/>
           </a:xfrm>
           <a:prstGeom prst="rect">
@@ -11025,7 +11025,7 @@
         </p:nvSpPr>
         <p:spPr>
           <a:xfrm>
-            <a:off x="5895464" y="5014310"/>
+            <a:off x="6862873" y="5173335"/>
             <a:ext cx="2212547" cy="523220"/>
           </a:xfrm>
           <a:prstGeom prst="rect">
@@ -11042,18 +11042,14 @@
             <a:pPr algn="ctr"/>
             <a:r>
               <a:rPr lang="en-US" sz="1400" dirty="0"/>
-              <a:t>Amazon </a:t>
-            </a:r>
-            <a:r>
-              <a:rPr lang="en-US" sz="1400" dirty="0" err="1"/>
-              <a:t>SageMaker</a:t>
+              <a:t>Amazon SageMaker</a:t>
             </a:r>
             <a:br>
               <a:rPr lang="en-US" sz="1400" dirty="0"/>
             </a:br>
             <a:r>
               <a:rPr lang="en-US" sz="1400" dirty="0"/>
-              <a:t>Training</a:t>
+              <a:t>Training (training job)</a:t>
             </a:r>
           </a:p>
         </p:txBody>
@@ -11086,7 +11082,7 @@
         </p:blipFill>
         <p:spPr>
           <a:xfrm>
-            <a:off x="6658756" y="4241806"/>
+            <a:off x="7626165" y="4400831"/>
             <a:ext cx="711200" cy="711200"/>
           </a:xfrm>
           <a:prstGeom prst="rect">
@@ -11108,7 +11104,7 @@
         </p:nvSpPr>
         <p:spPr>
           <a:xfrm>
-            <a:off x="8410064" y="5014310"/>
+            <a:off x="9377473" y="5173335"/>
             <a:ext cx="2212547" cy="523220"/>
           </a:xfrm>
           <a:prstGeom prst="rect">
@@ -11169,7 +11165,7 @@
         </p:blipFill>
         <p:spPr>
           <a:xfrm>
-            <a:off x="9154306" y="4241806"/>
+            <a:off x="10121715" y="4400831"/>
             <a:ext cx="711200" cy="711200"/>
           </a:xfrm>
           <a:prstGeom prst="rect">
@@ -11191,7 +11187,7 @@
         </p:nvSpPr>
         <p:spPr>
           <a:xfrm>
-            <a:off x="10919459" y="5000739"/>
+            <a:off x="11947658" y="4388968"/>
             <a:ext cx="2301904" cy="307777"/>
           </a:xfrm>
           <a:prstGeom prst="rect">
@@ -11241,7 +11237,7 @@
         </p:blipFill>
         <p:spPr>
           <a:xfrm>
-            <a:off x="11714811" y="4242647"/>
+            <a:off x="12743010" y="3630876"/>
             <a:ext cx="711200" cy="711200"/>
           </a:xfrm>
           <a:prstGeom prst="rect">
@@ -11277,7 +11273,7 @@
         </p:blipFill>
         <p:spPr>
           <a:xfrm>
-            <a:off x="11835461" y="2301517"/>
+            <a:off x="12863660" y="1689746"/>
             <a:ext cx="469900" cy="469900"/>
           </a:xfrm>
           <a:prstGeom prst="rect">
@@ -11299,7 +11295,7 @@
         </p:nvSpPr>
         <p:spPr>
           <a:xfrm>
-            <a:off x="11118297" y="2839082"/>
+            <a:off x="12146496" y="2227311"/>
             <a:ext cx="1904228" cy="523220"/>
           </a:xfrm>
           <a:prstGeom prst="rect">
@@ -11349,7 +11345,7 @@
         </p:blipFill>
         <p:spPr>
           <a:xfrm>
-            <a:off x="11714811" y="6105032"/>
+            <a:off x="12743010" y="5493261"/>
             <a:ext cx="711200" cy="711200"/>
           </a:xfrm>
           <a:prstGeom prst="rect">
@@ -11371,7 +11367,7 @@
         </p:nvSpPr>
         <p:spPr>
           <a:xfrm>
-            <a:off x="11317135" y="6816232"/>
+            <a:off x="12345334" y="6204461"/>
             <a:ext cx="1506552" cy="307777"/>
           </a:xfrm>
           <a:prstGeom prst="rect">
@@ -11407,8 +11403,8 @@
         </p:nvSpPr>
         <p:spPr>
           <a:xfrm>
-            <a:off x="661782" y="2257611"/>
-            <a:ext cx="1691411" cy="307777"/>
+            <a:off x="2131985" y="2307007"/>
+            <a:ext cx="1691411" cy="738664"/>
           </a:xfrm>
           <a:prstGeom prst="rect">
             <a:avLst/>
@@ -11428,47 +11424,24 @@
                 <a:ea typeface="Amazon Ember" panose="020B0603020204020204" pitchFamily="34" charset="0"/>
                 <a:cs typeface="Amazon Ember" panose="020B0603020204020204" pitchFamily="34" charset="0"/>
               </a:rPr>
-              <a:t>Amazon Athena</a:t>
-            </a:r>
-          </a:p>
-        </p:txBody>
-      </p:sp>
-      <p:pic>
-        <p:nvPicPr>
-          <p:cNvPr id="24" name="Graphic 23">
-            <a:extLst>
-              <a:ext uri="{FF2B5EF4-FFF2-40B4-BE49-F238E27FC236}">
-                <a16:creationId xmlns:a16="http://schemas.microsoft.com/office/drawing/2014/main" id="{73D5AF1A-8275-A54D-AD5C-EAB19D998000}"/>
-              </a:ext>
-            </a:extLst>
-          </p:cNvPr>
-          <p:cNvPicPr>
-            <a:picLocks noChangeAspect="1"/>
-          </p:cNvPicPr>
-          <p:nvPr/>
-        </p:nvPicPr>
-        <p:blipFill>
-          <a:blip r:embed="rId10">
-            <a:extLst>
-              <a:ext uri="{96DAC541-7B7A-43D3-8B79-37D633B846F1}">
-                <asvg:svgBlip xmlns:asvg="http://schemas.microsoft.com/office/drawing/2016/SVG/main" r:embed="rId11"/>
-              </a:ext>
-            </a:extLst>
-          </a:blip>
-          <a:stretch>
-            <a:fillRect/>
-          </a:stretch>
-        </p:blipFill>
-        <p:spPr>
-          <a:xfrm>
-            <a:off x="1151887" y="1522864"/>
-            <a:ext cx="711200" cy="711200"/>
-          </a:xfrm>
-          <a:prstGeom prst="rect">
-            <a:avLst/>
-          </a:prstGeom>
-        </p:spPr>
-      </p:pic>
+              <a:t>Amazon SageMaker Studio </a:t>
+            </a:r>
+            <a:r>
+              <a:rPr lang="en-US" sz="1400" dirty="0" err="1">
+                <a:latin typeface="+mj-lt"/>
+                <a:ea typeface="Amazon Ember" panose="020B0603020204020204" pitchFamily="34" charset="0"/>
+                <a:cs typeface="Amazon Ember" panose="020B0603020204020204" pitchFamily="34" charset="0"/>
+              </a:rPr>
+              <a:t>JupyterLab</a:t>
+            </a:r>
+            <a:endParaRPr lang="en-US" sz="1400" dirty="0">
+              <a:latin typeface="+mj-lt"/>
+              <a:ea typeface="Amazon Ember" panose="020B0603020204020204" pitchFamily="34" charset="0"/>
+              <a:cs typeface="Amazon Ember" panose="020B0603020204020204" pitchFamily="34" charset="0"/>
+            </a:endParaRPr>
+          </a:p>
+        </p:txBody>
+      </p:sp>
       <p:cxnSp>
         <p:nvCxnSpPr>
           <p:cNvPr id="53" name="Elbow Connector 52">
@@ -11486,7 +11459,7 @@
         </p:nvCxnSpPr>
         <p:spPr>
           <a:xfrm flipV="1">
-            <a:off x="4678755" y="5537530"/>
+            <a:off x="5646164" y="5696555"/>
             <a:ext cx="4837583" cy="658216"/>
           </a:xfrm>
           <a:prstGeom prst="bentConnector2">
@@ -11529,52 +11502,8 @@
         </p:nvCxnSpPr>
         <p:spPr>
           <a:xfrm flipV="1">
-            <a:off x="4678755" y="5537530"/>
+            <a:off x="5646164" y="5696555"/>
             <a:ext cx="2322983" cy="658216"/>
-          </a:xfrm>
-          <a:prstGeom prst="bentConnector2">
-            <a:avLst/>
-          </a:prstGeom>
-          <a:ln>
-            <a:headEnd type="triangle"/>
-            <a:tailEnd type="triangle"/>
-          </a:ln>
-        </p:spPr>
-        <p:style>
-          <a:lnRef idx="2">
-            <a:schemeClr val="accent1"/>
-          </a:lnRef>
-          <a:fillRef idx="0">
-            <a:schemeClr val="accent1"/>
-          </a:fillRef>
-          <a:effectRef idx="1">
-            <a:schemeClr val="accent1"/>
-          </a:effectRef>
-          <a:fontRef idx="minor">
-            <a:schemeClr val="tx1"/>
-          </a:fontRef>
-        </p:style>
-      </p:cxnSp>
-      <p:cxnSp>
-        <p:nvCxnSpPr>
-          <p:cNvPr id="56" name="Elbow Connector 55">
-            <a:extLst>
-              <a:ext uri="{FF2B5EF4-FFF2-40B4-BE49-F238E27FC236}">
-                <a16:creationId xmlns:a16="http://schemas.microsoft.com/office/drawing/2014/main" id="{B9E139E0-E2E0-9445-9C8C-791104B6329B}"/>
-              </a:ext>
-            </a:extLst>
-          </p:cNvPr>
-          <p:cNvCxnSpPr>
-            <a:cxnSpLocks/>
-            <a:stCxn id="6" idx="1"/>
-            <a:endCxn id="23" idx="2"/>
-          </p:cNvCxnSpPr>
-          <p:nvPr/>
-        </p:nvCxnSpPr>
-        <p:spPr>
-          <a:xfrm rot="10800000">
-            <a:off x="1507489" y="2565388"/>
-            <a:ext cx="2701367" cy="3630358"/>
           </a:xfrm>
           <a:prstGeom prst="bentConnector2">
             <a:avLst/>
@@ -11617,8 +11546,8 @@
         </p:nvCxnSpPr>
         <p:spPr>
           <a:xfrm rot="10800000">
-            <a:off x="9865507" y="4597406"/>
-            <a:ext cx="1849305" cy="1863226"/>
+            <a:off x="10832916" y="4756431"/>
+            <a:ext cx="1910095" cy="1092430"/>
           </a:xfrm>
           <a:prstGeom prst="bentConnector3">
             <a:avLst>
@@ -11662,7 +11591,7 @@
         </p:nvCxnSpPr>
         <p:spPr>
           <a:xfrm flipV="1">
-            <a:off x="12070411" y="5308516"/>
+            <a:off x="13098610" y="4696745"/>
             <a:ext cx="0" cy="796516"/>
           </a:xfrm>
           <a:prstGeom prst="straightConnector1">
@@ -11702,7 +11631,7 @@
         </p:nvSpPr>
         <p:spPr>
           <a:xfrm>
-            <a:off x="7128509" y="7214613"/>
+            <a:off x="8095918" y="7373638"/>
             <a:ext cx="2301904" cy="523220"/>
           </a:xfrm>
           <a:prstGeom prst="rect">
@@ -11739,10 +11668,10 @@
           <p:nvPr/>
         </p:nvPicPr>
         <p:blipFill>
-          <a:blip r:embed="rId12">
+          <a:blip r:embed="rId10">
             <a:extLst>
               <a:ext uri="{96DAC541-7B7A-43D3-8B79-37D633B846F1}">
-                <asvg:svgBlip xmlns:asvg="http://schemas.microsoft.com/office/drawing/2016/SVG/main" r:embed="rId13"/>
+                <asvg:svgBlip xmlns:asvg="http://schemas.microsoft.com/office/drawing/2016/SVG/main" r:embed="rId11"/>
               </a:ext>
             </a:extLst>
           </a:blip>
@@ -11752,7 +11681,7 @@
         </p:blipFill>
         <p:spPr>
           <a:xfrm>
-            <a:off x="7923861" y="6542158"/>
+            <a:off x="8891270" y="6701183"/>
             <a:ext cx="711200" cy="711200"/>
           </a:xfrm>
           <a:prstGeom prst="rect">
@@ -11778,7 +11707,7 @@
         </p:nvCxnSpPr>
         <p:spPr>
           <a:xfrm rot="10800000" flipV="1">
-            <a:off x="8279462" y="4597406"/>
+            <a:off x="9246871" y="4756431"/>
             <a:ext cx="874845" cy="1944752"/>
           </a:xfrm>
           <a:prstGeom prst="bentConnector2">
@@ -11828,7 +11757,7 @@
         </p:nvCxnSpPr>
         <p:spPr>
           <a:xfrm>
-            <a:off x="7369956" y="4597406"/>
+            <a:off x="8337365" y="4756431"/>
             <a:ext cx="909505" cy="1944752"/>
           </a:xfrm>
           <a:prstGeom prst="bentConnector2">
@@ -11872,14 +11801,14 @@
           <p:cNvCxnSpPr>
             <a:cxnSpLocks/>
             <a:stCxn id="54" idx="0"/>
-            <a:endCxn id="8" idx="2"/>
+            <a:endCxn id="23" idx="2"/>
           </p:cNvCxnSpPr>
           <p:nvPr/>
         </p:nvCxnSpPr>
         <p:spPr>
-          <a:xfrm rot="5400000" flipH="1" flipV="1">
-            <a:off x="3725894" y="3530108"/>
-            <a:ext cx="1427332" cy="4293"/>
+          <a:xfrm rot="16200000" flipV="1">
+            <a:off x="3511620" y="2511742"/>
+            <a:ext cx="1359274" cy="2427132"/>
           </a:xfrm>
           <a:prstGeom prst="bentConnector3">
             <a:avLst>
@@ -11925,14 +11854,14 @@
           <p:cNvCxnSpPr>
             <a:cxnSpLocks/>
             <a:stCxn id="14" idx="0"/>
-            <a:endCxn id="8" idx="2"/>
+            <a:endCxn id="23" idx="2"/>
           </p:cNvCxnSpPr>
           <p:nvPr/>
         </p:nvCxnSpPr>
         <p:spPr>
           <a:xfrm rot="16200000" flipV="1">
-            <a:off x="5016423" y="2243872"/>
-            <a:ext cx="1423218" cy="2572649"/>
+            <a:off x="4802148" y="1221214"/>
+            <a:ext cx="1355160" cy="5004074"/>
           </a:xfrm>
           <a:prstGeom prst="bentConnector3">
             <a:avLst>
@@ -11978,19 +11907,17 @@
           <p:cNvCxnSpPr>
             <a:cxnSpLocks/>
             <a:stCxn id="16" idx="0"/>
-            <a:endCxn id="8" idx="2"/>
+            <a:endCxn id="9" idx="3"/>
           </p:cNvCxnSpPr>
           <p:nvPr/>
         </p:nvCxnSpPr>
         <p:spPr>
           <a:xfrm rot="16200000" flipV="1">
-            <a:off x="6264198" y="996097"/>
-            <a:ext cx="1423218" cy="5068199"/>
-          </a:xfrm>
-          <a:prstGeom prst="bentConnector3">
-            <a:avLst>
-              <a:gd name="adj1" fmla="val 50000"/>
-            </a:avLst>
+            <a:off x="6672645" y="596160"/>
+            <a:ext cx="2524169" cy="5085173"/>
+          </a:xfrm>
+          <a:prstGeom prst="bentConnector2">
+            <a:avLst/>
           </a:prstGeom>
           <a:ln w="12700">
             <a:solidFill>
@@ -12033,8 +11960,8 @@
         </p:nvSpPr>
         <p:spPr>
           <a:xfrm>
-            <a:off x="661782" y="1170203"/>
-            <a:ext cx="4761515" cy="1632800"/>
+            <a:off x="1976566" y="1402667"/>
+            <a:ext cx="4164152" cy="1722698"/>
           </a:xfrm>
           <a:prstGeom prst="rect">
             <a:avLst/>
@@ -12079,7 +12006,7 @@
                   <a:schemeClr val="tx1"/>
                 </a:solidFill>
               </a:rPr>
-              <a:t>Data Exploration, Data Visualization &amp; Analysis</a:t>
+              <a:t>IDEs</a:t>
             </a:r>
           </a:p>
         </p:txBody>
@@ -12102,7 +12029,7 @@
         </p:nvCxnSpPr>
         <p:spPr>
           <a:xfrm flipV="1">
-            <a:off x="12070411" y="3362302"/>
+            <a:off x="13098610" y="2750531"/>
             <a:ext cx="0" cy="880345"/>
           </a:xfrm>
           <a:prstGeom prst="straightConnector1">
@@ -12142,7 +12069,7 @@
         </p:nvSpPr>
         <p:spPr>
           <a:xfrm>
-            <a:off x="3337540" y="5016231"/>
+            <a:off x="4304949" y="5175256"/>
             <a:ext cx="2212547" cy="523220"/>
           </a:xfrm>
           <a:prstGeom prst="rect">
@@ -12166,7 +12093,7 @@
             </a:br>
             <a:r>
               <a:rPr lang="en-US" sz="1400" dirty="0"/>
-              <a:t>Processing</a:t>
+              <a:t>Training (data prep job)</a:t>
             </a:r>
           </a:p>
         </p:txBody>
@@ -12189,7 +12116,7 @@
         </p:nvCxnSpPr>
         <p:spPr>
           <a:xfrm rot="5400000" flipH="1" flipV="1">
-            <a:off x="4233137" y="5750120"/>
+            <a:off x="5200546" y="5909145"/>
             <a:ext cx="421345" cy="9"/>
           </a:xfrm>
           <a:prstGeom prst="bentConnector3">
@@ -12245,7 +12172,7 @@
         </p:blipFill>
         <p:spPr>
           <a:xfrm>
-            <a:off x="4081814" y="4245920"/>
+            <a:off x="5049223" y="4404945"/>
             <a:ext cx="711200" cy="711200"/>
           </a:xfrm>
           <a:prstGeom prst="rect">
@@ -12267,8 +12194,8 @@
         </p:nvSpPr>
         <p:spPr>
           <a:xfrm>
-            <a:off x="3325344" y="3155665"/>
-            <a:ext cx="7196439" cy="2366280"/>
+            <a:off x="4292753" y="3314689"/>
+            <a:ext cx="7196439" cy="2503593"/>
           </a:xfrm>
           <a:prstGeom prst="rect">
             <a:avLst/>
@@ -12320,57 +12247,6 @@
       </p:sp>
       <p:cxnSp>
         <p:nvCxnSpPr>
-          <p:cNvPr id="70" name="Straight Arrow Connector 69">
-            <a:extLst>
-              <a:ext uri="{FF2B5EF4-FFF2-40B4-BE49-F238E27FC236}">
-                <a16:creationId xmlns:a16="http://schemas.microsoft.com/office/drawing/2014/main" id="{DA450F3F-5628-B443-8152-8D996C1EE45F}"/>
-              </a:ext>
-            </a:extLst>
-          </p:cNvPr>
-          <p:cNvCxnSpPr>
-            <a:cxnSpLocks/>
-            <a:stCxn id="24" idx="3"/>
-            <a:endCxn id="9" idx="1"/>
-          </p:cNvCxnSpPr>
-          <p:nvPr/>
-        </p:nvCxnSpPr>
-        <p:spPr>
-          <a:xfrm>
-            <a:off x="1863087" y="1878464"/>
-            <a:ext cx="2223019" cy="0"/>
-          </a:xfrm>
-          <a:prstGeom prst="straightConnector1">
-            <a:avLst/>
-          </a:prstGeom>
-          <a:ln w="12700">
-            <a:solidFill>
-              <a:schemeClr val="tx1">
-                <a:lumMod val="50000"/>
-              </a:schemeClr>
-            </a:solidFill>
-            <a:prstDash val="sysDot"/>
-            <a:headEnd type="triangle"/>
-            <a:tailEnd type="triangle"/>
-          </a:ln>
-          <a:effectLst/>
-        </p:spPr>
-        <p:style>
-          <a:lnRef idx="2">
-            <a:schemeClr val="accent1"/>
-          </a:lnRef>
-          <a:fillRef idx="0">
-            <a:schemeClr val="accent1"/>
-          </a:fillRef>
-          <a:effectRef idx="1">
-            <a:schemeClr val="accent1"/>
-          </a:effectRef>
-          <a:fontRef idx="minor">
-            <a:schemeClr val="tx1"/>
-          </a:fontRef>
-        </p:style>
-      </p:cxnSp>
-      <p:cxnSp>
-        <p:nvCxnSpPr>
           <p:cNvPr id="48" name="Elbow Connector 47">
             <a:extLst>
               <a:ext uri="{FF2B5EF4-FFF2-40B4-BE49-F238E27FC236}">
@@ -12387,7 +12263,7 @@
         </p:nvCxnSpPr>
         <p:spPr>
           <a:xfrm>
-            <a:off x="4793014" y="4601520"/>
+            <a:off x="5760423" y="4760545"/>
             <a:ext cx="3130847" cy="2296238"/>
           </a:xfrm>
           <a:prstGeom prst="bentConnector3">
@@ -12449,7 +12325,7 @@
         </p:blipFill>
         <p:spPr>
           <a:xfrm>
-            <a:off x="9822360" y="2428696"/>
+            <a:off x="10789769" y="2587721"/>
             <a:ext cx="711200" cy="711200"/>
           </a:xfrm>
           <a:prstGeom prst="rect">
@@ -12471,7 +12347,7 @@
         </p:nvSpPr>
         <p:spPr>
           <a:xfrm>
-            <a:off x="7803298" y="2552263"/>
+            <a:off x="8468629" y="2696320"/>
             <a:ext cx="2212547" cy="523220"/>
           </a:xfrm>
           <a:prstGeom prst="rect">
@@ -12504,6 +12380,405 @@
           </a:p>
         </p:txBody>
       </p:sp>
+      <p:pic>
+        <p:nvPicPr>
+          <p:cNvPr id="3" name="Graphic 2">
+            <a:extLst>
+              <a:ext uri="{FF2B5EF4-FFF2-40B4-BE49-F238E27FC236}">
+                <a16:creationId xmlns:a16="http://schemas.microsoft.com/office/drawing/2014/main" id="{90F23D3C-9D4F-4AB1-547D-4629AA216290}"/>
+              </a:ext>
+            </a:extLst>
+          </p:cNvPr>
+          <p:cNvPicPr>
+            <a:picLocks noChangeAspect="1"/>
+          </p:cNvPicPr>
+          <p:nvPr/>
+        </p:nvPicPr>
+        <p:blipFill>
+          <a:blip r:embed="rId4">
+            <a:extLst>
+              <a:ext uri="{96DAC541-7B7A-43D3-8B79-37D633B846F1}">
+                <asvg:svgBlip xmlns:asvg="http://schemas.microsoft.com/office/drawing/2016/SVG/main" r:embed="rId5"/>
+              </a:ext>
+            </a:extLst>
+          </a:blip>
+          <a:stretch>
+            <a:fillRect/>
+          </a:stretch>
+        </p:blipFill>
+        <p:spPr>
+          <a:xfrm>
+            <a:off x="2622090" y="1516112"/>
+            <a:ext cx="711200" cy="711200"/>
+          </a:xfrm>
+          <a:prstGeom prst="rect">
+            <a:avLst/>
+          </a:prstGeom>
+        </p:spPr>
+      </p:pic>
+      <p:cxnSp>
+        <p:nvCxnSpPr>
+          <p:cNvPr id="28" name="Elbow Connector 27">
+            <a:extLst>
+              <a:ext uri="{FF2B5EF4-FFF2-40B4-BE49-F238E27FC236}">
+                <a16:creationId xmlns:a16="http://schemas.microsoft.com/office/drawing/2014/main" id="{01E2F8E8-86AB-01B5-E057-09E8D9301150}"/>
+              </a:ext>
+            </a:extLst>
+          </p:cNvPr>
+          <p:cNvCxnSpPr>
+            <a:cxnSpLocks/>
+            <a:stCxn id="39" idx="0"/>
+            <a:endCxn id="9" idx="3"/>
+          </p:cNvCxnSpPr>
+          <p:nvPr/>
+        </p:nvCxnSpPr>
+        <p:spPr>
+          <a:xfrm rot="16200000" flipV="1">
+            <a:off x="7913227" y="-644422"/>
+            <a:ext cx="711059" cy="5753227"/>
+          </a:xfrm>
+          <a:prstGeom prst="bentConnector2">
+            <a:avLst/>
+          </a:prstGeom>
+          <a:ln w="12700">
+            <a:solidFill>
+              <a:schemeClr val="tx1">
+                <a:lumMod val="50000"/>
+              </a:schemeClr>
+            </a:solidFill>
+            <a:prstDash val="sysDot"/>
+            <a:headEnd type="triangle"/>
+            <a:tailEnd type="triangle"/>
+          </a:ln>
+          <a:effectLst/>
+        </p:spPr>
+        <p:style>
+          <a:lnRef idx="2">
+            <a:schemeClr val="accent1"/>
+          </a:lnRef>
+          <a:fillRef idx="0">
+            <a:schemeClr val="accent1"/>
+          </a:fillRef>
+          <a:effectRef idx="1">
+            <a:schemeClr val="accent1"/>
+          </a:effectRef>
+          <a:fontRef idx="minor">
+            <a:schemeClr val="tx1"/>
+          </a:fontRef>
+        </p:style>
+      </p:cxnSp>
+      <p:sp>
+        <p:nvSpPr>
+          <p:cNvPr id="31" name="Rectangle 30">
+            <a:extLst>
+              <a:ext uri="{FF2B5EF4-FFF2-40B4-BE49-F238E27FC236}">
+                <a16:creationId xmlns:a16="http://schemas.microsoft.com/office/drawing/2014/main" id="{5A92B92D-A83B-CFBA-41E9-AA77CF7DF69C}"/>
+              </a:ext>
+            </a:extLst>
+          </p:cNvPr>
+          <p:cNvSpPr/>
+          <p:nvPr/>
+        </p:nvSpPr>
+        <p:spPr>
+          <a:xfrm>
+            <a:off x="1976565" y="932768"/>
+            <a:ext cx="4164152" cy="467353"/>
+          </a:xfrm>
+          <a:prstGeom prst="rect">
+            <a:avLst/>
+          </a:prstGeom>
+          <a:solidFill>
+            <a:schemeClr val="accent2"/>
+          </a:solidFill>
+          <a:ln>
+            <a:noFill/>
+          </a:ln>
+        </p:spPr>
+        <p:style>
+          <a:lnRef idx="0">
+            <a:scrgbClr r="0" g="0" b="0"/>
+          </a:lnRef>
+          <a:fillRef idx="0">
+            <a:scrgbClr r="0" g="0" b="0"/>
+          </a:fillRef>
+          <a:effectRef idx="0">
+            <a:scrgbClr r="0" g="0" b="0"/>
+          </a:effectRef>
+          <a:fontRef idx="minor">
+            <a:schemeClr val="lt1"/>
+          </a:fontRef>
+        </p:style>
+        <p:txBody>
+          <a:bodyPr rtlCol="0" anchor="ctr"/>
+          <a:lstStyle/>
+          <a:p>
+            <a:pPr algn="ctr"/>
+            <a:r>
+              <a:rPr lang="en-US" sz="1400" dirty="0"/>
+              <a:t>Amazon SageMaker Studio</a:t>
+            </a:r>
+          </a:p>
+        </p:txBody>
+      </p:sp>
+      <p:pic>
+        <p:nvPicPr>
+          <p:cNvPr id="37" name="Graphic 21">
+            <a:extLst>
+              <a:ext uri="{FF2B5EF4-FFF2-40B4-BE49-F238E27FC236}">
+                <a16:creationId xmlns:a16="http://schemas.microsoft.com/office/drawing/2014/main" id="{D868C858-4056-B189-1275-6A7829F149B5}"/>
+              </a:ext>
+            </a:extLst>
+          </p:cNvPr>
+          <p:cNvPicPr>
+            <a:picLocks noChangeAspect="1" noChangeArrowheads="1"/>
+          </p:cNvPicPr>
+          <p:nvPr/>
+        </p:nvPicPr>
+        <p:blipFill>
+          <a:blip r:embed="rId12">
+            <a:extLst>
+              <a:ext uri="{96DAC541-7B7A-43D3-8B79-37D633B846F1}">
+                <asvg:svgBlip xmlns:asvg="http://schemas.microsoft.com/office/drawing/2016/SVG/main" r:embed="rId13"/>
+              </a:ext>
+            </a:extLst>
+          </a:blip>
+          <a:srcRect/>
+          <a:stretch/>
+        </p:blipFill>
+        <p:spPr bwMode="auto">
+          <a:xfrm>
+            <a:off x="740490" y="1636762"/>
+            <a:ext cx="469900" cy="469900"/>
+          </a:xfrm>
+          <a:prstGeom prst="rect">
+            <a:avLst/>
+          </a:prstGeom>
+          <a:noFill/>
+          <a:ln>
+            <a:noFill/>
+          </a:ln>
+          <a:extLst>
+            <a:ext uri="{909E8E84-426E-40DD-AFC4-6F175D3DCCD1}">
+              <a14:hiddenFill xmlns:a14="http://schemas.microsoft.com/office/drawing/2010/main">
+                <a:solidFill>
+                  <a:srgbClr val="FFFFFF"/>
+                </a:solidFill>
+              </a14:hiddenFill>
+            </a:ext>
+            <a:ext uri="{91240B29-F687-4F45-9708-019B960494DF}">
+              <a14:hiddenLine xmlns:a14="http://schemas.microsoft.com/office/drawing/2010/main" w="9525">
+                <a:solidFill>
+                  <a:srgbClr val="000000"/>
+                </a:solidFill>
+                <a:miter lim="800000"/>
+                <a:headEnd/>
+                <a:tailEnd/>
+              </a14:hiddenLine>
+            </a:ext>
+          </a:extLst>
+        </p:spPr>
+      </p:pic>
+      <p:sp>
+        <p:nvSpPr>
+          <p:cNvPr id="38" name="TextBox 38">
+            <a:extLst>
+              <a:ext uri="{FF2B5EF4-FFF2-40B4-BE49-F238E27FC236}">
+                <a16:creationId xmlns:a16="http://schemas.microsoft.com/office/drawing/2014/main" id="{A3263DF8-8B81-AA87-DE5B-E2674E9B34DC}"/>
+              </a:ext>
+            </a:extLst>
+          </p:cNvPr>
+          <p:cNvSpPr txBox="1">
+            <a:spLocks noChangeArrowheads="1"/>
+          </p:cNvSpPr>
+          <p:nvPr/>
+        </p:nvSpPr>
+        <p:spPr bwMode="auto">
+          <a:xfrm>
+            <a:off x="441367" y="2244110"/>
+            <a:ext cx="1073150" cy="261610"/>
+          </a:xfrm>
+          <a:prstGeom prst="rect">
+            <a:avLst/>
+          </a:prstGeom>
+          <a:noFill/>
+          <a:ln>
+            <a:noFill/>
+          </a:ln>
+          <a:extLst>
+            <a:ext uri="{909E8E84-426E-40DD-AFC4-6F175D3DCCD1}">
+              <a14:hiddenFill xmlns:a14="http://schemas.microsoft.com/office/drawing/2010/main">
+                <a:solidFill>
+                  <a:srgbClr val="FFFFFF"/>
+                </a:solidFill>
+              </a14:hiddenFill>
+            </a:ext>
+            <a:ext uri="{91240B29-F687-4F45-9708-019B960494DF}">
+              <a14:hiddenLine xmlns:a14="http://schemas.microsoft.com/office/drawing/2010/main" w="9525">
+                <a:solidFill>
+                  <a:srgbClr val="000000"/>
+                </a:solidFill>
+                <a:miter lim="800000"/>
+                <a:headEnd/>
+                <a:tailEnd/>
+              </a14:hiddenLine>
+            </a:ext>
+          </a:extLst>
+        </p:spPr>
+        <p:txBody>
+          <a:bodyPr>
+            <a:spAutoFit/>
+          </a:bodyPr>
+          <a:lstStyle>
+            <a:lvl1pPr>
+              <a:defRPr>
+                <a:solidFill>
+                  <a:schemeClr val="tx1"/>
+                </a:solidFill>
+                <a:latin typeface="Calibri" panose="020F0502020204030204" pitchFamily="34" charset="0"/>
+              </a:defRPr>
+            </a:lvl1pPr>
+            <a:lvl2pPr marL="742950" indent="-285750">
+              <a:defRPr>
+                <a:solidFill>
+                  <a:schemeClr val="tx1"/>
+                </a:solidFill>
+                <a:latin typeface="Calibri" panose="020F0502020204030204" pitchFamily="34" charset="0"/>
+              </a:defRPr>
+            </a:lvl2pPr>
+            <a:lvl3pPr marL="1143000" indent="-228600">
+              <a:defRPr>
+                <a:solidFill>
+                  <a:schemeClr val="tx1"/>
+                </a:solidFill>
+                <a:latin typeface="Calibri" panose="020F0502020204030204" pitchFamily="34" charset="0"/>
+              </a:defRPr>
+            </a:lvl3pPr>
+            <a:lvl4pPr marL="1600200" indent="-228600">
+              <a:defRPr>
+                <a:solidFill>
+                  <a:schemeClr val="tx1"/>
+                </a:solidFill>
+                <a:latin typeface="Calibri" panose="020F0502020204030204" pitchFamily="34" charset="0"/>
+              </a:defRPr>
+            </a:lvl4pPr>
+            <a:lvl5pPr marL="2057400" indent="-228600">
+              <a:defRPr>
+                <a:solidFill>
+                  <a:schemeClr val="tx1"/>
+                </a:solidFill>
+                <a:latin typeface="Calibri" panose="020F0502020204030204" pitchFamily="34" charset="0"/>
+              </a:defRPr>
+            </a:lvl5pPr>
+            <a:lvl6pPr marL="2514600" indent="-228600" eaLnBrk="0" fontAlgn="base" hangingPunct="0">
+              <a:spcBef>
+                <a:spcPct val="0"/>
+              </a:spcBef>
+              <a:spcAft>
+                <a:spcPct val="0"/>
+              </a:spcAft>
+              <a:defRPr>
+                <a:solidFill>
+                  <a:schemeClr val="tx1"/>
+                </a:solidFill>
+                <a:latin typeface="Calibri" panose="020F0502020204030204" pitchFamily="34" charset="0"/>
+              </a:defRPr>
+            </a:lvl6pPr>
+            <a:lvl7pPr marL="2971800" indent="-228600" eaLnBrk="0" fontAlgn="base" hangingPunct="0">
+              <a:spcBef>
+                <a:spcPct val="0"/>
+              </a:spcBef>
+              <a:spcAft>
+                <a:spcPct val="0"/>
+              </a:spcAft>
+              <a:defRPr>
+                <a:solidFill>
+                  <a:schemeClr val="tx1"/>
+                </a:solidFill>
+                <a:latin typeface="Calibri" panose="020F0502020204030204" pitchFamily="34" charset="0"/>
+              </a:defRPr>
+            </a:lvl7pPr>
+            <a:lvl8pPr marL="3429000" indent="-228600" eaLnBrk="0" fontAlgn="base" hangingPunct="0">
+              <a:spcBef>
+                <a:spcPct val="0"/>
+              </a:spcBef>
+              <a:spcAft>
+                <a:spcPct val="0"/>
+              </a:spcAft>
+              <a:defRPr>
+                <a:solidFill>
+                  <a:schemeClr val="tx1"/>
+                </a:solidFill>
+                <a:latin typeface="Calibri" panose="020F0502020204030204" pitchFamily="34" charset="0"/>
+              </a:defRPr>
+            </a:lvl8pPr>
+            <a:lvl9pPr marL="3886200" indent="-228600" eaLnBrk="0" fontAlgn="base" hangingPunct="0">
+              <a:spcBef>
+                <a:spcPct val="0"/>
+              </a:spcBef>
+              <a:spcAft>
+                <a:spcPct val="0"/>
+              </a:spcAft>
+              <a:defRPr>
+                <a:solidFill>
+                  <a:schemeClr val="tx1"/>
+                </a:solidFill>
+                <a:latin typeface="Calibri" panose="020F0502020204030204" pitchFamily="34" charset="0"/>
+              </a:defRPr>
+            </a:lvl9pPr>
+          </a:lstStyle>
+          <a:p>
+            <a:pPr algn="ctr" eaLnBrk="1" hangingPunct="1"/>
+            <a:r>
+              <a:rPr lang="en-US" altLang="en-US" sz="1100" dirty="0">
+                <a:latin typeface="Arial" panose="020B0604020202020204" pitchFamily="34" charset="0"/>
+                <a:cs typeface="Arial" panose="020B0604020202020204" pitchFamily="34" charset="0"/>
+              </a:rPr>
+              <a:t>User</a:t>
+            </a:r>
+          </a:p>
+        </p:txBody>
+      </p:sp>
+      <p:cxnSp>
+        <p:nvCxnSpPr>
+          <p:cNvPr id="46" name="Straight Arrow Connector 45">
+            <a:extLst>
+              <a:ext uri="{FF2B5EF4-FFF2-40B4-BE49-F238E27FC236}">
+                <a16:creationId xmlns:a16="http://schemas.microsoft.com/office/drawing/2014/main" id="{423D5B4F-1835-4239-3AFB-43029F14DA45}"/>
+              </a:ext>
+            </a:extLst>
+          </p:cNvPr>
+          <p:cNvCxnSpPr>
+            <a:stCxn id="37" idx="3"/>
+          </p:cNvCxnSpPr>
+          <p:nvPr/>
+        </p:nvCxnSpPr>
+        <p:spPr>
+          <a:xfrm>
+            <a:off x="1210390" y="1871712"/>
+            <a:ext cx="766175" cy="0"/>
+          </a:xfrm>
+          <a:prstGeom prst="straightConnector1">
+            <a:avLst/>
+          </a:prstGeom>
+          <a:ln>
+            <a:tailEnd type="triangle"/>
+          </a:ln>
+        </p:spPr>
+        <p:style>
+          <a:lnRef idx="2">
+            <a:schemeClr val="accent1"/>
+          </a:lnRef>
+          <a:fillRef idx="0">
+            <a:schemeClr val="accent1"/>
+          </a:fillRef>
+          <a:effectRef idx="1">
+            <a:schemeClr val="accent1"/>
+          </a:effectRef>
+          <a:fontRef idx="minor">
+            <a:schemeClr val="tx1"/>
+          </a:fontRef>
+        </p:style>
+      </p:cxnSp>
     </p:spTree>
     <p:extLst>
       <p:ext uri="{BB962C8B-B14F-4D97-AF65-F5344CB8AC3E}">
@@ -12927,7 +13202,7 @@
           <a:p>
             <a:r>
               <a:rPr lang="en-US" sz="2000" dirty="0"/>
-              <a:t>Amazon Web Services EMEA</a:t>
+              <a:t>Amazon Web Services</a:t>
             </a:r>
           </a:p>
         </p:txBody>
@@ -13855,21 +14130,6 @@
 </file>
 
 <file path=customXml/item1.xml><?xml version="1.0" encoding="utf-8"?>
-<?mso-contentType ?>
-<FormTemplates xmlns="http://schemas.microsoft.com/sharepoint/v3/contenttype/forms">
-  <Display>DocumentLibraryForm</Display>
-  <Edit>DocumentLibraryForm</Edit>
-  <New>DocumentLibraryForm</New>
-</FormTemplates>
-</file>
-
-<file path=customXml/item2.xml><?xml version="1.0" encoding="utf-8"?>
-<p:properties xmlns:p="http://schemas.microsoft.com/office/2006/metadata/properties" xmlns:xsi="http://www.w3.org/2001/XMLSchema-instance">
-  <documentManagement/>
-</p:properties>
-</file>
-
-<file path=customXml/item3.xml><?xml version="1.0" encoding="utf-8"?>
 <ct:contentTypeSchema xmlns:ct="http://schemas.microsoft.com/office/2006/metadata/contentType" xmlns:ma="http://schemas.microsoft.com/office/2006/metadata/properties/metaAttributes" ct:_="" ma:_="" ma:contentTypeName="Document" ma:contentTypeID="0x010100D26A3D6C04DFD740953BA1B2B9E62D60" ma:contentTypeVersion="0" ma:contentTypeDescription="Create a new document." ma:contentTypeScope="" ma:versionID="26617cd14cd3af163c0e97ff614e520a">
   <xsd:schema xmlns:xsd="http://www.w3.org/2001/XMLSchema" xmlns:xs="http://www.w3.org/2001/XMLSchema" xmlns:p="http://schemas.microsoft.com/office/2006/metadata/properties" targetNamespace="http://schemas.microsoft.com/office/2006/metadata/properties" ma:root="true" ma:fieldsID="c64490b4aec6201516c3a874156f37b2">
     <xsd:element name="properties">
@@ -13983,10 +14243,33 @@
 </ct:contentTypeSchema>
 </file>
 
+<file path=customXml/item2.xml><?xml version="1.0" encoding="utf-8"?>
+<p:properties xmlns:p="http://schemas.microsoft.com/office/2006/metadata/properties" xmlns:xsi="http://www.w3.org/2001/XMLSchema-instance">
+  <documentManagement/>
+</p:properties>
+</file>
+
+<file path=customXml/item3.xml><?xml version="1.0" encoding="utf-8"?>
+<?mso-contentType ?>
+<FormTemplates xmlns="http://schemas.microsoft.com/sharepoint/v3/contenttype/forms">
+  <Display>DocumentLibraryForm</Display>
+  <Edit>DocumentLibraryForm</Edit>
+  <New>DocumentLibraryForm</New>
+</FormTemplates>
+</file>
+
 <file path=customXml/itemProps1.xml><?xml version="1.0" encoding="utf-8"?>
-<ds:datastoreItem xmlns:ds="http://schemas.openxmlformats.org/officeDocument/2006/customXml" ds:itemID="{705B35A6-8B52-46A5-AE45-B98C6459DC10}">
+<ds:datastoreItem xmlns:ds="http://schemas.openxmlformats.org/officeDocument/2006/customXml" ds:itemID="{51A3258A-222C-4488-825E-7520D001FB75}">
   <ds:schemaRefs>
-    <ds:schemaRef ds:uri="http://schemas.microsoft.com/sharepoint/v3/contenttype/forms"/>
+    <ds:schemaRef ds:uri="http://schemas.microsoft.com/office/2006/metadata/contentType"/>
+    <ds:schemaRef ds:uri="http://schemas.microsoft.com/office/2006/metadata/properties/metaAttributes"/>
+    <ds:schemaRef ds:uri="http://www.w3.org/2001/XMLSchema"/>
+    <ds:schemaRef ds:uri="http://schemas.microsoft.com/office/2006/metadata/properties"/>
+    <ds:schemaRef ds:uri="http://schemas.openxmlformats.org/package/2006/metadata/core-properties"/>
+    <ds:schemaRef ds:uri="http://purl.org/dc/elements/1.1/"/>
+    <ds:schemaRef ds:uri="http://purl.org/dc/terms/"/>
+    <ds:schemaRef ds:uri="http://schemas.microsoft.com/internal/obd"/>
+    <ds:schemaRef ds:uri="http://schemas.microsoft.com/office/infopath/2007/PartnerControls"/>
   </ds:schemaRefs>
 </ds:datastoreItem>
 </file>
@@ -14007,17 +14290,9 @@
 </file>
 
 <file path=customXml/itemProps3.xml><?xml version="1.0" encoding="utf-8"?>
-<ds:datastoreItem xmlns:ds="http://schemas.openxmlformats.org/officeDocument/2006/customXml" ds:itemID="{51A3258A-222C-4488-825E-7520D001FB75}">
+<ds:datastoreItem xmlns:ds="http://schemas.openxmlformats.org/officeDocument/2006/customXml" ds:itemID="{705B35A6-8B52-46A5-AE45-B98C6459DC10}">
   <ds:schemaRefs>
-    <ds:schemaRef ds:uri="http://schemas.microsoft.com/office/2006/metadata/contentType"/>
-    <ds:schemaRef ds:uri="http://schemas.microsoft.com/office/2006/metadata/properties/metaAttributes"/>
-    <ds:schemaRef ds:uri="http://www.w3.org/2001/XMLSchema"/>
-    <ds:schemaRef ds:uri="http://schemas.microsoft.com/office/2006/metadata/properties"/>
-    <ds:schemaRef ds:uri="http://schemas.openxmlformats.org/package/2006/metadata/core-properties"/>
-    <ds:schemaRef ds:uri="http://purl.org/dc/elements/1.1/"/>
-    <ds:schemaRef ds:uri="http://purl.org/dc/terms/"/>
-    <ds:schemaRef ds:uri="http://schemas.microsoft.com/internal/obd"/>
-    <ds:schemaRef ds:uri="http://schemas.microsoft.com/office/infopath/2007/PartnerControls"/>
+    <ds:schemaRef ds:uri="http://schemas.microsoft.com/sharepoint/v3/contenttype/forms"/>
   </ds:schemaRefs>
 </ds:datastoreItem>
 </file>
</xml_diff>